<commit_message>
#3 - observing logs discussion planning
- finished observing logs, will need to check and edit comments/notes though
- my eyes really hurt help
- and added a few sub titles into the discussion section to help keep things clear
</commit_message>
<xml_diff>
--- a/laboratory_project/report/results/covariance/covariance.pptx
+++ b/laboratory_project/report/results/covariance/covariance.pptx
@@ -3640,6 +3640,152 @@
               </a:rPr>
               <a:t>0.15</a:t>
             </a:r>
+          </a:p>
+        </p:txBody>
+      </p:sp>
+      <p:sp>
+        <p:nvSpPr>
+          <p:cNvPr id="14" name="TextBox 13"/>
+          <p:cNvSpPr txBox="1"/>
+          <p:nvPr/>
+        </p:nvSpPr>
+        <p:spPr>
+          <a:xfrm rot="19200000">
+            <a:off x="5706767" y="3551394"/>
+            <a:ext cx="583699" cy="276999"/>
+          </a:xfrm>
+          <a:prstGeom prst="rect">
+            <a:avLst/>
+          </a:prstGeom>
+          <a:noFill/>
+        </p:spPr>
+        <p:txBody>
+          <a:bodyPr wrap="square" rtlCol="0">
+            <a:spAutoFit/>
+          </a:bodyPr>
+          <a:lstStyle/>
+          <a:p>
+            <a:pPr algn="ctr"/>
+            <a:r>
+              <a:rPr lang="en-GB" sz="1200" b="1" smtClean="0">
+                <a:latin typeface="CMU Serif" charset="0"/>
+                <a:ea typeface="CMU Serif" charset="0"/>
+                <a:cs typeface="CMU Serif" charset="0"/>
+              </a:rPr>
+              <a:t>36.25</a:t>
+            </a:r>
+            <a:endParaRPr lang="en-GB" sz="1200" b="1" dirty="0" smtClean="0">
+              <a:latin typeface="CMU Serif" charset="0"/>
+              <a:ea typeface="CMU Serif" charset="0"/>
+              <a:cs typeface="CMU Serif" charset="0"/>
+            </a:endParaRPr>
+          </a:p>
+        </p:txBody>
+      </p:sp>
+      <p:sp>
+        <p:nvSpPr>
+          <p:cNvPr id="15" name="TextBox 14"/>
+          <p:cNvSpPr txBox="1"/>
+          <p:nvPr/>
+        </p:nvSpPr>
+        <p:spPr>
+          <a:xfrm rot="19200000">
+            <a:off x="6087256" y="3551258"/>
+            <a:ext cx="583699" cy="276999"/>
+          </a:xfrm>
+          <a:prstGeom prst="rect">
+            <a:avLst/>
+          </a:prstGeom>
+          <a:noFill/>
+        </p:spPr>
+        <p:txBody>
+          <a:bodyPr wrap="square" rtlCol="0">
+            <a:spAutoFit/>
+          </a:bodyPr>
+          <a:lstStyle/>
+          <a:p>
+            <a:pPr algn="ctr"/>
+            <a:r>
+              <a:rPr lang="en-GB" sz="1200" b="1" dirty="0" smtClean="0">
+                <a:latin typeface="CMU Serif" charset="0"/>
+                <a:ea typeface="CMU Serif" charset="0"/>
+                <a:cs typeface="CMU Serif" charset="0"/>
+              </a:rPr>
+              <a:t>36.50</a:t>
+            </a:r>
+          </a:p>
+        </p:txBody>
+      </p:sp>
+      <p:sp>
+        <p:nvSpPr>
+          <p:cNvPr id="16" name="TextBox 15"/>
+          <p:cNvSpPr txBox="1"/>
+          <p:nvPr/>
+        </p:nvSpPr>
+        <p:spPr>
+          <a:xfrm rot="19200000">
+            <a:off x="4544248" y="2874269"/>
+            <a:ext cx="583699" cy="276999"/>
+          </a:xfrm>
+          <a:prstGeom prst="rect">
+            <a:avLst/>
+          </a:prstGeom>
+          <a:noFill/>
+        </p:spPr>
+        <p:txBody>
+          <a:bodyPr wrap="square" rtlCol="0">
+            <a:spAutoFit/>
+          </a:bodyPr>
+          <a:lstStyle/>
+          <a:p>
+            <a:pPr algn="ctr"/>
+            <a:r>
+              <a:rPr lang="en-GB" sz="1200" b="1" dirty="0" smtClean="0">
+                <a:latin typeface="CMU Serif" charset="0"/>
+                <a:ea typeface="CMU Serif" charset="0"/>
+                <a:cs typeface="CMU Serif" charset="0"/>
+              </a:rPr>
+              <a:t>0.00</a:t>
+            </a:r>
+          </a:p>
+        </p:txBody>
+      </p:sp>
+      <p:sp>
+        <p:nvSpPr>
+          <p:cNvPr id="17" name="TextBox 16"/>
+          <p:cNvSpPr txBox="1"/>
+          <p:nvPr/>
+        </p:nvSpPr>
+        <p:spPr>
+          <a:xfrm rot="19200000">
+            <a:off x="4522021" y="3229883"/>
+            <a:ext cx="583699" cy="276999"/>
+          </a:xfrm>
+          <a:prstGeom prst="rect">
+            <a:avLst/>
+          </a:prstGeom>
+          <a:noFill/>
+        </p:spPr>
+        <p:txBody>
+          <a:bodyPr wrap="square" rtlCol="0">
+            <a:spAutoFit/>
+          </a:bodyPr>
+          <a:lstStyle/>
+          <a:p>
+            <a:pPr algn="ctr"/>
+            <a:r>
+              <a:rPr lang="en-GB" sz="1200" b="1" smtClean="0">
+                <a:latin typeface="CMU Serif" charset="0"/>
+                <a:ea typeface="CMU Serif" charset="0"/>
+                <a:cs typeface="CMU Serif" charset="0"/>
+              </a:rPr>
+              <a:t>-0.15</a:t>
+            </a:r>
+            <a:endParaRPr lang="en-GB" sz="1200" b="1" dirty="0" smtClean="0">
+              <a:latin typeface="CMU Serif" charset="0"/>
+              <a:ea typeface="CMU Serif" charset="0"/>
+              <a:cs typeface="CMU Serif" charset="0"/>
+            </a:endParaRPr>
           </a:p>
         </p:txBody>
       </p:sp>

</xml_diff>

<commit_message>
#1 - morning work
- created images from our fits files using aplpy
- created a collage of these images
- added to lab report
- improved acknowledgements section
</commit_message>
<xml_diff>
--- a/laboratory_project/report/results/covariance/covariance.pptx
+++ b/laboratory_project/report/results/covariance/covariance.pptx
@@ -3354,8 +3354,8 @@
         </p:nvSpPr>
         <p:spPr>
           <a:xfrm rot="16200000">
-            <a:off x="3769928" y="2735626"/>
-            <a:ext cx="1574124" cy="338554"/>
+            <a:off x="3769928" y="2766403"/>
+            <a:ext cx="1574124" cy="276999"/>
           </a:xfrm>
           <a:prstGeom prst="rect">
             <a:avLst/>
@@ -3370,14 +3370,14 @@
           <a:p>
             <a:pPr algn="ctr"/>
             <a:r>
-              <a:rPr lang="en-GB" sz="1600" b="1" dirty="0" smtClean="0">
+              <a:rPr lang="en-GB" sz="1200" b="1" dirty="0" smtClean="0">
                 <a:latin typeface="CMU Serif Roman" charset="0"/>
                 <a:ea typeface="CMU Serif Roman" charset="0"/>
                 <a:cs typeface="CMU Serif Roman" charset="0"/>
               </a:rPr>
               <a:t>EBVhost</a:t>
             </a:r>
-            <a:endParaRPr lang="en-GB" sz="1600" b="1" dirty="0">
+            <a:endParaRPr lang="en-GB" sz="1200" b="1" dirty="0">
               <a:latin typeface="CMU Serif Roman" charset="0"/>
               <a:ea typeface="CMU Serif Roman" charset="0"/>
               <a:cs typeface="CMU Serif Roman" charset="0"/>
@@ -3393,8 +3393,8 @@
         </p:nvSpPr>
         <p:spPr>
           <a:xfrm rot="16200000">
-            <a:off x="3769928" y="1483757"/>
-            <a:ext cx="1574124" cy="338554"/>
+            <a:off x="3769928" y="1514534"/>
+            <a:ext cx="1574124" cy="276999"/>
           </a:xfrm>
           <a:prstGeom prst="rect">
             <a:avLst/>
@@ -3409,14 +3409,14 @@
           <a:p>
             <a:pPr algn="ctr"/>
             <a:r>
-              <a:rPr lang="en-GB" sz="1600" b="1" dirty="0" smtClean="0">
+              <a:rPr lang="en-GB" sz="1200" b="1" dirty="0" smtClean="0">
                 <a:latin typeface="CMU Serif Roman" charset="0"/>
                 <a:ea typeface="CMU Serif Roman" charset="0"/>
                 <a:cs typeface="CMU Serif Roman" charset="0"/>
               </a:rPr>
               <a:t>Tmax</a:t>
             </a:r>
-            <a:endParaRPr lang="en-GB" sz="1600" b="1" dirty="0">
+            <a:endParaRPr lang="en-GB" sz="1200" b="1" dirty="0">
               <a:latin typeface="CMU Serif Roman" charset="0"/>
               <a:ea typeface="CMU Serif Roman" charset="0"/>
               <a:cs typeface="CMU Serif Roman" charset="0"/>
@@ -3433,7 +3433,7 @@
         <p:spPr>
           <a:xfrm>
             <a:off x="5043100" y="3842650"/>
-            <a:ext cx="1574124" cy="338554"/>
+            <a:ext cx="1574124" cy="276999"/>
           </a:xfrm>
           <a:prstGeom prst="rect">
             <a:avLst/>
@@ -3448,14 +3448,14 @@
           <a:p>
             <a:pPr algn="ctr"/>
             <a:r>
-              <a:rPr lang="en-GB" sz="1600" b="1" dirty="0" smtClean="0">
+              <a:rPr lang="en-GB" sz="1200" b="1" dirty="0" smtClean="0">
                 <a:latin typeface="CMU Serif Roman" charset="0"/>
                 <a:ea typeface="CMU Serif Roman" charset="0"/>
                 <a:cs typeface="CMU Serif Roman" charset="0"/>
               </a:rPr>
               <a:t>DM (pc)</a:t>
             </a:r>
-            <a:endParaRPr lang="en-GB" sz="1600" b="1" dirty="0">
+            <a:endParaRPr lang="en-GB" sz="1200" b="1" dirty="0">
               <a:latin typeface="CMU Serif Roman" charset="0"/>
               <a:ea typeface="CMU Serif Roman" charset="0"/>
               <a:cs typeface="CMU Serif Roman" charset="0"/>
@@ -3471,8 +3471,8 @@
         </p:nvSpPr>
         <p:spPr>
           <a:xfrm>
-            <a:off x="6674069" y="3842650"/>
-            <a:ext cx="1574124" cy="338554"/>
+            <a:off x="6691701" y="3842649"/>
+            <a:ext cx="1574124" cy="276999"/>
           </a:xfrm>
           <a:prstGeom prst="rect">
             <a:avLst/>
@@ -3487,14 +3487,14 @@
           <a:p>
             <a:pPr algn="ctr"/>
             <a:r>
-              <a:rPr lang="en-GB" sz="1600" b="1" dirty="0" smtClean="0">
+              <a:rPr lang="en-GB" sz="1200" b="1" dirty="0" smtClean="0">
                 <a:latin typeface="CMU Serif Roman" charset="0"/>
                 <a:ea typeface="CMU Serif Roman" charset="0"/>
                 <a:cs typeface="CMU Serif Roman" charset="0"/>
               </a:rPr>
               <a:t>dm15</a:t>
             </a:r>
-            <a:endParaRPr lang="en-GB" sz="1600" b="1" dirty="0">
+            <a:endParaRPr lang="en-GB" sz="1200" b="1" dirty="0">
               <a:latin typeface="CMU Serif Roman" charset="0"/>
               <a:ea typeface="CMU Serif Roman" charset="0"/>
               <a:cs typeface="CMU Serif Roman" charset="0"/>

</xml_diff>

<commit_message>
#4.51 - covariance graph completed
</commit_message>
<xml_diff>
--- a/laboratory_project/report/results/covariance/covariance.pptx
+++ b/laboratory_project/report/results/covariance/covariance.pptx
@@ -107,6 +107,11 @@
       </a:defRPr>
     </a:lvl9pPr>
   </p:defaultTextStyle>
+  <p:extLst>
+    <p:ext uri="{EFAFB233-063F-42B5-8137-9DF3F51BA10A}">
+      <p15:sldGuideLst xmlns:p15="http://schemas.microsoft.com/office/powerpoint/2012/main"/>
+    </p:ext>
+  </p:extLst>
 </p:presentation>
 </file>
 
@@ -192,7 +197,7 @@
           <a:p>
             <a:fld id="{2B5AE358-8325-4346-95C5-66AF7CC77EBA}" type="datetimeFigureOut">
               <a:rPr lang="en-GB" smtClean="0"/>
-              <a:t>18/12/2017</a:t>
+              <a:t>23/12/2017</a:t>
             </a:fld>
             <a:endParaRPr lang="en-GB"/>
           </a:p>
@@ -591,7 +596,7 @@
           <a:p>
             <a:fld id="{9E2C71E0-4DEE-6F43-B4DF-21E738019ADF}" type="datetimeFigureOut">
               <a:rPr lang="en-GB" smtClean="0"/>
-              <a:t>18/12/2017</a:t>
+              <a:t>23/12/2017</a:t>
             </a:fld>
             <a:endParaRPr lang="en-GB"/>
           </a:p>
@@ -761,7 +766,7 @@
           <a:p>
             <a:fld id="{9E2C71E0-4DEE-6F43-B4DF-21E738019ADF}" type="datetimeFigureOut">
               <a:rPr lang="en-GB" smtClean="0"/>
-              <a:t>18/12/2017</a:t>
+              <a:t>23/12/2017</a:t>
             </a:fld>
             <a:endParaRPr lang="en-GB"/>
           </a:p>
@@ -941,7 +946,7 @@
           <a:p>
             <a:fld id="{9E2C71E0-4DEE-6F43-B4DF-21E738019ADF}" type="datetimeFigureOut">
               <a:rPr lang="en-GB" smtClean="0"/>
-              <a:t>18/12/2017</a:t>
+              <a:t>23/12/2017</a:t>
             </a:fld>
             <a:endParaRPr lang="en-GB"/>
           </a:p>
@@ -1111,7 +1116,7 @@
           <a:p>
             <a:fld id="{9E2C71E0-4DEE-6F43-B4DF-21E738019ADF}" type="datetimeFigureOut">
               <a:rPr lang="en-GB" smtClean="0"/>
-              <a:t>18/12/2017</a:t>
+              <a:t>23/12/2017</a:t>
             </a:fld>
             <a:endParaRPr lang="en-GB"/>
           </a:p>
@@ -1357,7 +1362,7 @@
           <a:p>
             <a:fld id="{9E2C71E0-4DEE-6F43-B4DF-21E738019ADF}" type="datetimeFigureOut">
               <a:rPr lang="en-GB" smtClean="0"/>
-              <a:t>18/12/2017</a:t>
+              <a:t>23/12/2017</a:t>
             </a:fld>
             <a:endParaRPr lang="en-GB"/>
           </a:p>
@@ -1589,7 +1594,7 @@
           <a:p>
             <a:fld id="{9E2C71E0-4DEE-6F43-B4DF-21E738019ADF}" type="datetimeFigureOut">
               <a:rPr lang="en-GB" smtClean="0"/>
-              <a:t>18/12/2017</a:t>
+              <a:t>23/12/2017</a:t>
             </a:fld>
             <a:endParaRPr lang="en-GB"/>
           </a:p>
@@ -1956,7 +1961,7 @@
           <a:p>
             <a:fld id="{9E2C71E0-4DEE-6F43-B4DF-21E738019ADF}" type="datetimeFigureOut">
               <a:rPr lang="en-GB" smtClean="0"/>
-              <a:t>18/12/2017</a:t>
+              <a:t>23/12/2017</a:t>
             </a:fld>
             <a:endParaRPr lang="en-GB"/>
           </a:p>
@@ -2074,7 +2079,7 @@
           <a:p>
             <a:fld id="{9E2C71E0-4DEE-6F43-B4DF-21E738019ADF}" type="datetimeFigureOut">
               <a:rPr lang="en-GB" smtClean="0"/>
-              <a:t>18/12/2017</a:t>
+              <a:t>23/12/2017</a:t>
             </a:fld>
             <a:endParaRPr lang="en-GB"/>
           </a:p>
@@ -2169,7 +2174,7 @@
           <a:p>
             <a:fld id="{9E2C71E0-4DEE-6F43-B4DF-21E738019ADF}" type="datetimeFigureOut">
               <a:rPr lang="en-GB" smtClean="0"/>
-              <a:t>18/12/2017</a:t>
+              <a:t>23/12/2017</a:t>
             </a:fld>
             <a:endParaRPr lang="en-GB"/>
           </a:p>
@@ -2446,7 +2451,7 @@
           <a:p>
             <a:fld id="{9E2C71E0-4DEE-6F43-B4DF-21E738019ADF}" type="datetimeFigureOut">
               <a:rPr lang="en-GB" smtClean="0"/>
-              <a:t>18/12/2017</a:t>
+              <a:t>23/12/2017</a:t>
             </a:fld>
             <a:endParaRPr lang="en-GB"/>
           </a:p>
@@ -2699,7 +2704,7 @@
           <a:p>
             <a:fld id="{9E2C71E0-4DEE-6F43-B4DF-21E738019ADF}" type="datetimeFigureOut">
               <a:rPr lang="en-GB" smtClean="0"/>
-              <a:t>18/12/2017</a:t>
+              <a:t>23/12/2017</a:t>
             </a:fld>
             <a:endParaRPr lang="en-GB"/>
           </a:p>
@@ -2912,7 +2917,7 @@
           <a:p>
             <a:fld id="{9E2C71E0-4DEE-6F43-B4DF-21E738019ADF}" type="datetimeFigureOut">
               <a:rPr lang="en-GB" smtClean="0"/>
-              <a:t>18/12/2017</a:t>
+              <a:t>23/12/2017</a:t>
             </a:fld>
             <a:endParaRPr lang="en-GB"/>
           </a:p>
@@ -3780,6 +3785,335 @@
                 <a:cs typeface="CMU Serif" charset="0"/>
               </a:rPr>
               <a:t>-0.15</a:t>
+            </a:r>
+            <a:endParaRPr lang="en-GB" sz="1200" b="1" dirty="0" smtClean="0">
+              <a:latin typeface="CMU Serif" charset="0"/>
+              <a:ea typeface="CMU Serif" charset="0"/>
+              <a:cs typeface="CMU Serif" charset="0"/>
+            </a:endParaRPr>
+          </a:p>
+        </p:txBody>
+      </p:sp>
+      <p:sp>
+        <p:nvSpPr>
+          <p:cNvPr id="18" name="TextBox 17"/>
+          <p:cNvSpPr txBox="1"/>
+          <p:nvPr/>
+        </p:nvSpPr>
+        <p:spPr>
+          <a:xfrm rot="19200000">
+            <a:off x="6593724" y="3477832"/>
+            <a:ext cx="583699" cy="461665"/>
+          </a:xfrm>
+          <a:prstGeom prst="rect">
+            <a:avLst/>
+          </a:prstGeom>
+          <a:noFill/>
+        </p:spPr>
+        <p:txBody>
+          <a:bodyPr wrap="square" rtlCol="0">
+            <a:spAutoFit/>
+          </a:bodyPr>
+          <a:lstStyle/>
+          <a:p>
+            <a:pPr algn="ctr"/>
+            <a:r>
+              <a:rPr lang="en-GB" sz="1200" b="1" smtClean="0">
+                <a:latin typeface="CMU Serif" charset="0"/>
+                <a:ea typeface="CMU Serif" charset="0"/>
+                <a:cs typeface="CMU Serif" charset="0"/>
+              </a:rPr>
+              <a:t>0.6</a:t>
+            </a:r>
+          </a:p>
+          <a:p>
+            <a:pPr algn="ctr"/>
+            <a:endParaRPr lang="en-GB" sz="1200" b="1" dirty="0" smtClean="0">
+              <a:latin typeface="CMU Serif" charset="0"/>
+              <a:ea typeface="CMU Serif" charset="0"/>
+              <a:cs typeface="CMU Serif" charset="0"/>
+            </a:endParaRPr>
+          </a:p>
+        </p:txBody>
+      </p:sp>
+      <p:sp>
+        <p:nvSpPr>
+          <p:cNvPr id="19" name="TextBox 18"/>
+          <p:cNvSpPr txBox="1"/>
+          <p:nvPr/>
+        </p:nvSpPr>
+        <p:spPr>
+          <a:xfrm rot="19200000">
+            <a:off x="7063111" y="3477831"/>
+            <a:ext cx="482395" cy="461665"/>
+          </a:xfrm>
+          <a:prstGeom prst="rect">
+            <a:avLst/>
+          </a:prstGeom>
+          <a:noFill/>
+        </p:spPr>
+        <p:txBody>
+          <a:bodyPr wrap="square" rtlCol="0">
+            <a:spAutoFit/>
+          </a:bodyPr>
+          <a:lstStyle/>
+          <a:p>
+            <a:pPr algn="ctr"/>
+            <a:r>
+              <a:rPr lang="en-GB" sz="1200" b="1" dirty="0" smtClean="0">
+                <a:latin typeface="CMU Serif" charset="0"/>
+                <a:ea typeface="CMU Serif" charset="0"/>
+                <a:cs typeface="CMU Serif" charset="0"/>
+              </a:rPr>
+              <a:t>0.8</a:t>
+            </a:r>
+          </a:p>
+          <a:p>
+            <a:pPr algn="ctr"/>
+            <a:endParaRPr lang="en-GB" sz="1200" b="1" dirty="0" smtClean="0">
+              <a:latin typeface="CMU Serif" charset="0"/>
+              <a:ea typeface="CMU Serif" charset="0"/>
+              <a:cs typeface="CMU Serif" charset="0"/>
+            </a:endParaRPr>
+          </a:p>
+        </p:txBody>
+      </p:sp>
+      <p:sp>
+        <p:nvSpPr>
+          <p:cNvPr id="20" name="TextBox 19"/>
+          <p:cNvSpPr txBox="1"/>
+          <p:nvPr/>
+        </p:nvSpPr>
+        <p:spPr>
+          <a:xfrm rot="19200000">
+            <a:off x="7479433" y="3478208"/>
+            <a:ext cx="482395" cy="461665"/>
+          </a:xfrm>
+          <a:prstGeom prst="rect">
+            <a:avLst/>
+          </a:prstGeom>
+          <a:noFill/>
+        </p:spPr>
+        <p:txBody>
+          <a:bodyPr wrap="square" rtlCol="0">
+            <a:spAutoFit/>
+          </a:bodyPr>
+          <a:lstStyle/>
+          <a:p>
+            <a:pPr algn="ctr"/>
+            <a:r>
+              <a:rPr lang="en-GB" sz="1200" b="1" smtClean="0">
+                <a:latin typeface="CMU Serif" charset="0"/>
+                <a:ea typeface="CMU Serif" charset="0"/>
+                <a:cs typeface="CMU Serif" charset="0"/>
+              </a:rPr>
+              <a:t>1.0</a:t>
+            </a:r>
+            <a:endParaRPr lang="en-GB" sz="1200" b="1" dirty="0" smtClean="0">
+              <a:latin typeface="CMU Serif" charset="0"/>
+              <a:ea typeface="CMU Serif" charset="0"/>
+              <a:cs typeface="CMU Serif" charset="0"/>
+            </a:endParaRPr>
+          </a:p>
+          <a:p>
+            <a:pPr algn="ctr"/>
+            <a:endParaRPr lang="en-GB" sz="1200" b="1" dirty="0" smtClean="0">
+              <a:latin typeface="CMU Serif" charset="0"/>
+              <a:ea typeface="CMU Serif" charset="0"/>
+              <a:cs typeface="CMU Serif" charset="0"/>
+            </a:endParaRPr>
+          </a:p>
+        </p:txBody>
+      </p:sp>
+      <p:sp>
+        <p:nvSpPr>
+          <p:cNvPr id="21" name="TextBox 20"/>
+          <p:cNvSpPr txBox="1"/>
+          <p:nvPr/>
+        </p:nvSpPr>
+        <p:spPr>
+          <a:xfrm rot="19200000">
+            <a:off x="7901346" y="3477832"/>
+            <a:ext cx="482395" cy="461665"/>
+          </a:xfrm>
+          <a:prstGeom prst="rect">
+            <a:avLst/>
+          </a:prstGeom>
+          <a:noFill/>
+        </p:spPr>
+        <p:txBody>
+          <a:bodyPr wrap="square" rtlCol="0">
+            <a:spAutoFit/>
+          </a:bodyPr>
+          <a:lstStyle/>
+          <a:p>
+            <a:pPr algn="ctr"/>
+            <a:r>
+              <a:rPr lang="en-GB" sz="1200" b="1" dirty="0" smtClean="0">
+                <a:latin typeface="CMU Serif" charset="0"/>
+                <a:ea typeface="CMU Serif" charset="0"/>
+                <a:cs typeface="CMU Serif" charset="0"/>
+              </a:rPr>
+              <a:t>1.2</a:t>
+            </a:r>
+          </a:p>
+          <a:p>
+            <a:pPr algn="ctr"/>
+            <a:endParaRPr lang="en-GB" sz="1200" b="1" dirty="0" smtClean="0">
+              <a:latin typeface="CMU Serif" charset="0"/>
+              <a:ea typeface="CMU Serif" charset="0"/>
+              <a:cs typeface="CMU Serif" charset="0"/>
+            </a:endParaRPr>
+          </a:p>
+        </p:txBody>
+      </p:sp>
+      <p:sp>
+        <p:nvSpPr>
+          <p:cNvPr id="22" name="TextBox 21"/>
+          <p:cNvSpPr txBox="1"/>
+          <p:nvPr/>
+        </p:nvSpPr>
+        <p:spPr>
+          <a:xfrm rot="19200000">
+            <a:off x="4592443" y="1852900"/>
+            <a:ext cx="583699" cy="276999"/>
+          </a:xfrm>
+          <a:prstGeom prst="rect">
+            <a:avLst/>
+          </a:prstGeom>
+          <a:noFill/>
+        </p:spPr>
+        <p:txBody>
+          <a:bodyPr wrap="square" rtlCol="0">
+            <a:spAutoFit/>
+          </a:bodyPr>
+          <a:lstStyle/>
+          <a:p>
+            <a:pPr algn="ctr"/>
+            <a:r>
+              <a:rPr lang="en-GB" sz="1200" b="1" smtClean="0">
+                <a:latin typeface="CMU Serif" charset="0"/>
+                <a:ea typeface="CMU Serif" charset="0"/>
+                <a:cs typeface="CMU Serif" charset="0"/>
+              </a:rPr>
+              <a:t>-2</a:t>
+            </a:r>
+            <a:endParaRPr lang="en-GB" sz="1200" b="1" dirty="0" smtClean="0">
+              <a:latin typeface="CMU Serif" charset="0"/>
+              <a:ea typeface="CMU Serif" charset="0"/>
+              <a:cs typeface="CMU Serif" charset="0"/>
+            </a:endParaRPr>
+          </a:p>
+        </p:txBody>
+      </p:sp>
+      <p:sp>
+        <p:nvSpPr>
+          <p:cNvPr id="23" name="TextBox 22"/>
+          <p:cNvSpPr txBox="1"/>
+          <p:nvPr/>
+        </p:nvSpPr>
+        <p:spPr>
+          <a:xfrm rot="19200000">
+            <a:off x="4608581" y="1578618"/>
+            <a:ext cx="583699" cy="276999"/>
+          </a:xfrm>
+          <a:prstGeom prst="rect">
+            <a:avLst/>
+          </a:prstGeom>
+          <a:noFill/>
+        </p:spPr>
+        <p:txBody>
+          <a:bodyPr wrap="square" rtlCol="0">
+            <a:spAutoFit/>
+          </a:bodyPr>
+          <a:lstStyle/>
+          <a:p>
+            <a:pPr algn="ctr"/>
+            <a:r>
+              <a:rPr lang="en-GB" sz="1200" b="1" smtClean="0">
+                <a:latin typeface="CMU Serif" charset="0"/>
+                <a:ea typeface="CMU Serif" charset="0"/>
+                <a:cs typeface="CMU Serif" charset="0"/>
+              </a:rPr>
+              <a:t>0</a:t>
+            </a:r>
+            <a:endParaRPr lang="en-GB" sz="1200" b="1" dirty="0" smtClean="0">
+              <a:latin typeface="CMU Serif" charset="0"/>
+              <a:ea typeface="CMU Serif" charset="0"/>
+              <a:cs typeface="CMU Serif" charset="0"/>
+            </a:endParaRPr>
+          </a:p>
+        </p:txBody>
+      </p:sp>
+      <p:sp>
+        <p:nvSpPr>
+          <p:cNvPr id="24" name="TextBox 23"/>
+          <p:cNvSpPr txBox="1"/>
+          <p:nvPr/>
+        </p:nvSpPr>
+        <p:spPr>
+          <a:xfrm rot="19200000">
+            <a:off x="4612242" y="1330195"/>
+            <a:ext cx="583699" cy="276999"/>
+          </a:xfrm>
+          <a:prstGeom prst="rect">
+            <a:avLst/>
+          </a:prstGeom>
+          <a:noFill/>
+        </p:spPr>
+        <p:txBody>
+          <a:bodyPr wrap="square" rtlCol="0">
+            <a:spAutoFit/>
+          </a:bodyPr>
+          <a:lstStyle/>
+          <a:p>
+            <a:pPr algn="ctr"/>
+            <a:r>
+              <a:rPr lang="en-GB" sz="1200" b="1">
+                <a:latin typeface="CMU Serif" charset="0"/>
+                <a:ea typeface="CMU Serif" charset="0"/>
+                <a:cs typeface="CMU Serif" charset="0"/>
+              </a:rPr>
+              <a:t>2</a:t>
+            </a:r>
+            <a:endParaRPr lang="en-GB" sz="1200" b="1" dirty="0" smtClean="0">
+              <a:latin typeface="CMU Serif" charset="0"/>
+              <a:ea typeface="CMU Serif" charset="0"/>
+              <a:cs typeface="CMU Serif" charset="0"/>
+            </a:endParaRPr>
+          </a:p>
+        </p:txBody>
+      </p:sp>
+      <p:sp>
+        <p:nvSpPr>
+          <p:cNvPr id="25" name="TextBox 24"/>
+          <p:cNvSpPr txBox="1"/>
+          <p:nvPr/>
+        </p:nvSpPr>
+        <p:spPr>
+          <a:xfrm rot="19200000">
+            <a:off x="4606565" y="1092653"/>
+            <a:ext cx="583699" cy="276999"/>
+          </a:xfrm>
+          <a:prstGeom prst="rect">
+            <a:avLst/>
+          </a:prstGeom>
+          <a:noFill/>
+        </p:spPr>
+        <p:txBody>
+          <a:bodyPr wrap="square" rtlCol="0">
+            <a:spAutoFit/>
+          </a:bodyPr>
+          <a:lstStyle/>
+          <a:p>
+            <a:pPr algn="ctr"/>
+            <a:r>
+              <a:rPr lang="en-GB" sz="1200" b="1" smtClean="0">
+                <a:latin typeface="CMU Serif" charset="0"/>
+                <a:ea typeface="CMU Serif" charset="0"/>
+                <a:cs typeface="CMU Serif" charset="0"/>
+              </a:rPr>
+              <a:t>4</a:t>
             </a:r>
             <a:endParaRPr lang="en-GB" sz="1200" b="1" dirty="0" smtClean="0">
               <a:latin typeface="CMU Serif" charset="0"/>

</xml_diff>

<commit_message>
#3 - more or less concluded with the quality of fit
- dicussion of distance modulus and galactic extinction
- changed the size of the covariance plots
- bleugh
</commit_message>
<xml_diff>
--- a/laboratory_project/report/results/covariance/covariance.pptx
+++ b/laboratory_project/report/results/covariance/covariance.pptx
@@ -5,10 +5,11 @@
     <p:sldMasterId id="2147483648" r:id="rId1"/>
   </p:sldMasterIdLst>
   <p:notesMasterIdLst>
-    <p:notesMasterId r:id="rId3"/>
+    <p:notesMasterId r:id="rId4"/>
   </p:notesMasterIdLst>
   <p:sldIdLst>
     <p:sldId id="256" r:id="rId2"/>
+    <p:sldId id="257" r:id="rId3"/>
   </p:sldIdLst>
   <p:sldSz cx="12192000" cy="6858000"/>
   <p:notesSz cx="6858000" cy="9144000"/>
@@ -197,7 +198,7 @@
           <a:p>
             <a:fld id="{2B5AE358-8325-4346-95C5-66AF7CC77EBA}" type="datetimeFigureOut">
               <a:rPr lang="en-GB" smtClean="0"/>
-              <a:t>23/12/2017</a:t>
+              <a:t>04/01/2018</a:t>
             </a:fld>
             <a:endParaRPr lang="en-GB"/>
           </a:p>
@@ -465,6 +466,90 @@
 </p:notesMaster>
 </file>
 
+<file path=ppt/notesSlides/notesSlide1.xml><?xml version="1.0" encoding="utf-8"?>
+<p:notes xmlns:a="http://schemas.openxmlformats.org/drawingml/2006/main" xmlns:r="http://schemas.openxmlformats.org/officeDocument/2006/relationships" xmlns:p="http://schemas.openxmlformats.org/presentationml/2006/main">
+  <p:cSld>
+    <p:spTree>
+      <p:nvGrpSpPr>
+        <p:cNvPr id="1" name=""/>
+        <p:cNvGrpSpPr/>
+        <p:nvPr/>
+      </p:nvGrpSpPr>
+      <p:grpSpPr>
+        <a:xfrm>
+          <a:off x="0" y="0"/>
+          <a:ext cx="0" cy="0"/>
+          <a:chOff x="0" y="0"/>
+          <a:chExt cx="0" cy="0"/>
+        </a:xfrm>
+      </p:grpSpPr>
+      <p:sp>
+        <p:nvSpPr>
+          <p:cNvPr id="2" name="Slide Image Placeholder 1"/>
+          <p:cNvSpPr>
+            <a:spLocks noGrp="1" noRot="1" noChangeAspect="1"/>
+          </p:cNvSpPr>
+          <p:nvPr>
+            <p:ph type="sldImg"/>
+          </p:nvPr>
+        </p:nvSpPr>
+        <p:spPr/>
+      </p:sp>
+      <p:sp>
+        <p:nvSpPr>
+          <p:cNvPr id="3" name="Notes Placeholder 2"/>
+          <p:cNvSpPr>
+            <a:spLocks noGrp="1"/>
+          </p:cNvSpPr>
+          <p:nvPr>
+            <p:ph type="body" idx="1"/>
+          </p:nvPr>
+        </p:nvSpPr>
+        <p:spPr/>
+        <p:txBody>
+          <a:bodyPr/>
+          <a:lstStyle/>
+          <a:p>
+            <a:endParaRPr lang="en-GB" dirty="0"/>
+          </a:p>
+        </p:txBody>
+      </p:sp>
+      <p:sp>
+        <p:nvSpPr>
+          <p:cNvPr id="4" name="Slide Number Placeholder 3"/>
+          <p:cNvSpPr>
+            <a:spLocks noGrp="1"/>
+          </p:cNvSpPr>
+          <p:nvPr>
+            <p:ph type="sldNum" sz="quarter" idx="10"/>
+          </p:nvPr>
+        </p:nvSpPr>
+        <p:spPr/>
+        <p:txBody>
+          <a:bodyPr/>
+          <a:lstStyle/>
+          <a:p>
+            <a:fld id="{151192FC-D60D-A14E-B044-836C50097423}" type="slidenum">
+              <a:rPr lang="en-GB" smtClean="0"/>
+              <a:t>2</a:t>
+            </a:fld>
+            <a:endParaRPr lang="en-GB"/>
+          </a:p>
+        </p:txBody>
+      </p:sp>
+    </p:spTree>
+    <p:extLst>
+      <p:ext uri="{BB962C8B-B14F-4D97-AF65-F5344CB8AC3E}">
+        <p14:creationId xmlns:p14="http://schemas.microsoft.com/office/powerpoint/2010/main" val="619084024"/>
+      </p:ext>
+    </p:extLst>
+  </p:cSld>
+  <p:clrMapOvr>
+    <a:masterClrMapping/>
+  </p:clrMapOvr>
+</p:notes>
+</file>
+
 <file path=ppt/slideLayouts/slideLayout1.xml><?xml version="1.0" encoding="utf-8"?>
 <p:sldLayout xmlns:a="http://schemas.openxmlformats.org/drawingml/2006/main" xmlns:r="http://schemas.openxmlformats.org/officeDocument/2006/relationships" xmlns:p="http://schemas.openxmlformats.org/presentationml/2006/main" type="title" preserve="1">
   <p:cSld name="Title Slide">
@@ -596,7 +681,7 @@
           <a:p>
             <a:fld id="{9E2C71E0-4DEE-6F43-B4DF-21E738019ADF}" type="datetimeFigureOut">
               <a:rPr lang="en-GB" smtClean="0"/>
-              <a:t>23/12/2017</a:t>
+              <a:t>04/01/2018</a:t>
             </a:fld>
             <a:endParaRPr lang="en-GB"/>
           </a:p>
@@ -766,7 +851,7 @@
           <a:p>
             <a:fld id="{9E2C71E0-4DEE-6F43-B4DF-21E738019ADF}" type="datetimeFigureOut">
               <a:rPr lang="en-GB" smtClean="0"/>
-              <a:t>23/12/2017</a:t>
+              <a:t>04/01/2018</a:t>
             </a:fld>
             <a:endParaRPr lang="en-GB"/>
           </a:p>
@@ -946,7 +1031,7 @@
           <a:p>
             <a:fld id="{9E2C71E0-4DEE-6F43-B4DF-21E738019ADF}" type="datetimeFigureOut">
               <a:rPr lang="en-GB" smtClean="0"/>
-              <a:t>23/12/2017</a:t>
+              <a:t>04/01/2018</a:t>
             </a:fld>
             <a:endParaRPr lang="en-GB"/>
           </a:p>
@@ -1116,7 +1201,7 @@
           <a:p>
             <a:fld id="{9E2C71E0-4DEE-6F43-B4DF-21E738019ADF}" type="datetimeFigureOut">
               <a:rPr lang="en-GB" smtClean="0"/>
-              <a:t>23/12/2017</a:t>
+              <a:t>04/01/2018</a:t>
             </a:fld>
             <a:endParaRPr lang="en-GB"/>
           </a:p>
@@ -1362,7 +1447,7 @@
           <a:p>
             <a:fld id="{9E2C71E0-4DEE-6F43-B4DF-21E738019ADF}" type="datetimeFigureOut">
               <a:rPr lang="en-GB" smtClean="0"/>
-              <a:t>23/12/2017</a:t>
+              <a:t>04/01/2018</a:t>
             </a:fld>
             <a:endParaRPr lang="en-GB"/>
           </a:p>
@@ -1594,7 +1679,7 @@
           <a:p>
             <a:fld id="{9E2C71E0-4DEE-6F43-B4DF-21E738019ADF}" type="datetimeFigureOut">
               <a:rPr lang="en-GB" smtClean="0"/>
-              <a:t>23/12/2017</a:t>
+              <a:t>04/01/2018</a:t>
             </a:fld>
             <a:endParaRPr lang="en-GB"/>
           </a:p>
@@ -1961,7 +2046,7 @@
           <a:p>
             <a:fld id="{9E2C71E0-4DEE-6F43-B4DF-21E738019ADF}" type="datetimeFigureOut">
               <a:rPr lang="en-GB" smtClean="0"/>
-              <a:t>23/12/2017</a:t>
+              <a:t>04/01/2018</a:t>
             </a:fld>
             <a:endParaRPr lang="en-GB"/>
           </a:p>
@@ -2079,7 +2164,7 @@
           <a:p>
             <a:fld id="{9E2C71E0-4DEE-6F43-B4DF-21E738019ADF}" type="datetimeFigureOut">
               <a:rPr lang="en-GB" smtClean="0"/>
-              <a:t>23/12/2017</a:t>
+              <a:t>04/01/2018</a:t>
             </a:fld>
             <a:endParaRPr lang="en-GB"/>
           </a:p>
@@ -2174,7 +2259,7 @@
           <a:p>
             <a:fld id="{9E2C71E0-4DEE-6F43-B4DF-21E738019ADF}" type="datetimeFigureOut">
               <a:rPr lang="en-GB" smtClean="0"/>
-              <a:t>23/12/2017</a:t>
+              <a:t>04/01/2018</a:t>
             </a:fld>
             <a:endParaRPr lang="en-GB"/>
           </a:p>
@@ -2451,7 +2536,7 @@
           <a:p>
             <a:fld id="{9E2C71E0-4DEE-6F43-B4DF-21E738019ADF}" type="datetimeFigureOut">
               <a:rPr lang="en-GB" smtClean="0"/>
-              <a:t>23/12/2017</a:t>
+              <a:t>04/01/2018</a:t>
             </a:fld>
             <a:endParaRPr lang="en-GB"/>
           </a:p>
@@ -2704,7 +2789,7 @@
           <a:p>
             <a:fld id="{9E2C71E0-4DEE-6F43-B4DF-21E738019ADF}" type="datetimeFigureOut">
               <a:rPr lang="en-GB" smtClean="0"/>
-              <a:t>23/12/2017</a:t>
+              <a:t>04/01/2018</a:t>
             </a:fld>
             <a:endParaRPr lang="en-GB"/>
           </a:p>
@@ -2917,7 +3002,7 @@
           <a:p>
             <a:fld id="{9E2C71E0-4DEE-6F43-B4DF-21E738019ADF}" type="datetimeFigureOut">
               <a:rPr lang="en-GB" smtClean="0"/>
-              <a:t>23/12/2017</a:t>
+              <a:t>04/01/2018</a:t>
             </a:fld>
             <a:endParaRPr lang="en-GB"/>
           </a:p>
@@ -3458,7 +3543,15 @@
                 <a:ea typeface="CMU Serif Roman" charset="0"/>
                 <a:cs typeface="CMU Serif Roman" charset="0"/>
               </a:rPr>
-              <a:t>DM (pc)</a:t>
+              <a:t>DM </a:t>
+            </a:r>
+            <a:r>
+              <a:rPr lang="en-GB" sz="1200" b="1" dirty="0" smtClean="0">
+                <a:latin typeface="CMU Serif Roman" charset="0"/>
+                <a:ea typeface="CMU Serif Roman" charset="0"/>
+                <a:cs typeface="CMU Serif Roman" charset="0"/>
+              </a:rPr>
+              <a:t>(mag)</a:t>
             </a:r>
             <a:endParaRPr lang="en-GB" sz="1200" b="1" dirty="0">
               <a:latin typeface="CMU Serif Roman" charset="0"/>
@@ -4127,6 +4220,1572 @@
     <p:extLst>
       <p:ext uri="{BB962C8B-B14F-4D97-AF65-F5344CB8AC3E}">
         <p14:creationId xmlns:p14="http://schemas.microsoft.com/office/powerpoint/2010/main" val="1447064199"/>
+      </p:ext>
+    </p:extLst>
+  </p:cSld>
+  <p:clrMapOvr>
+    <a:masterClrMapping/>
+  </p:clrMapOvr>
+</p:sld>
+</file>
+
+<file path=ppt/slides/slide2.xml><?xml version="1.0" encoding="utf-8"?>
+<p:sld xmlns:a="http://schemas.openxmlformats.org/drawingml/2006/main" xmlns:r="http://schemas.openxmlformats.org/officeDocument/2006/relationships" xmlns:p="http://schemas.openxmlformats.org/presentationml/2006/main">
+  <p:cSld>
+    <p:spTree>
+      <p:nvGrpSpPr>
+        <p:cNvPr id="1" name=""/>
+        <p:cNvGrpSpPr/>
+        <p:nvPr/>
+      </p:nvGrpSpPr>
+      <p:grpSpPr>
+        <a:xfrm>
+          <a:off x="0" y="0"/>
+          <a:ext cx="0" cy="0"/>
+          <a:chOff x="0" y="0"/>
+          <a:chExt cx="0" cy="0"/>
+        </a:xfrm>
+      </p:grpSpPr>
+      <p:grpSp>
+        <p:nvGrpSpPr>
+          <p:cNvPr id="27" name="Group 26"/>
+          <p:cNvGrpSpPr/>
+          <p:nvPr/>
+        </p:nvGrpSpPr>
+        <p:grpSpPr>
+          <a:xfrm>
+            <a:off x="3684493" y="1121314"/>
+            <a:ext cx="5150223" cy="3859307"/>
+            <a:chOff x="3684493" y="1121314"/>
+            <a:chExt cx="5150223" cy="3859307"/>
+          </a:xfrm>
+        </p:grpSpPr>
+        <p:pic>
+          <p:nvPicPr>
+            <p:cNvPr id="4" name="Picture 3"/>
+            <p:cNvPicPr>
+              <a:picLocks noChangeAspect="1"/>
+            </p:cNvPicPr>
+            <p:nvPr/>
+          </p:nvPicPr>
+          <p:blipFill rotWithShape="1">
+            <a:blip r:embed="rId3">
+              <a:extLst>
+                <a:ext uri="{28A0092B-C50C-407E-A947-70E740481C1C}">
+                  <a14:useLocalDpi xmlns:a14="http://schemas.microsoft.com/office/drawing/2010/main" val="0"/>
+                </a:ext>
+              </a:extLst>
+            </a:blip>
+            <a:srcRect l="13292" t="27645" r="27850" b="16080"/>
+            <a:stretch/>
+          </p:blipFill>
+          <p:spPr>
+            <a:xfrm>
+              <a:off x="3684493" y="1121314"/>
+              <a:ext cx="5150223" cy="3859307"/>
+            </a:xfrm>
+            <a:prstGeom prst="rect">
+              <a:avLst/>
+            </a:prstGeom>
+          </p:spPr>
+        </p:pic>
+        <p:pic>
+          <p:nvPicPr>
+            <p:cNvPr id="5" name="Picture 4"/>
+            <p:cNvPicPr>
+              <a:picLocks noChangeAspect="1"/>
+            </p:cNvPicPr>
+            <p:nvPr/>
+          </p:nvPicPr>
+          <p:blipFill rotWithShape="1">
+            <a:blip r:embed="rId3">
+              <a:extLst>
+                <a:ext uri="{28A0092B-C50C-407E-A947-70E740481C1C}">
+                  <a14:useLocalDpi xmlns:a14="http://schemas.microsoft.com/office/drawing/2010/main" val="0"/>
+                </a:ext>
+              </a:extLst>
+            </a:blip>
+            <a:srcRect l="13917" t="46307" r="47587" b="17421"/>
+            <a:stretch/>
+          </p:blipFill>
+          <p:spPr>
+            <a:xfrm>
+              <a:off x="3736800" y="2407168"/>
+              <a:ext cx="3368566" cy="2487562"/>
+            </a:xfrm>
+            <a:prstGeom prst="rect">
+              <a:avLst/>
+            </a:prstGeom>
+          </p:spPr>
+        </p:pic>
+      </p:grpSp>
+      <p:sp>
+        <p:nvSpPr>
+          <p:cNvPr id="30" name="Rectangle 29"/>
+          <p:cNvSpPr/>
+          <p:nvPr/>
+        </p:nvSpPr>
+        <p:spPr>
+          <a:xfrm rot="5400000">
+            <a:off x="6082692" y="2525515"/>
+            <a:ext cx="355340" cy="5089545"/>
+          </a:xfrm>
+          <a:prstGeom prst="rect">
+            <a:avLst/>
+          </a:prstGeom>
+          <a:solidFill>
+            <a:schemeClr val="bg1"/>
+          </a:solidFill>
+          <a:ln>
+            <a:noFill/>
+          </a:ln>
+        </p:spPr>
+        <p:style>
+          <a:lnRef idx="2">
+            <a:schemeClr val="accent1">
+              <a:shade val="50000"/>
+            </a:schemeClr>
+          </a:lnRef>
+          <a:fillRef idx="1">
+            <a:schemeClr val="accent1"/>
+          </a:fillRef>
+          <a:effectRef idx="0">
+            <a:schemeClr val="accent1"/>
+          </a:effectRef>
+          <a:fontRef idx="minor">
+            <a:schemeClr val="lt1"/>
+          </a:fontRef>
+        </p:style>
+        <p:txBody>
+          <a:bodyPr rtlCol="0" anchor="ctr"/>
+          <a:lstStyle/>
+          <a:p>
+            <a:pPr algn="ctr"/>
+            <a:endParaRPr lang="en-GB"/>
+          </a:p>
+        </p:txBody>
+      </p:sp>
+      <p:sp>
+        <p:nvSpPr>
+          <p:cNvPr id="29" name="Rectangle 28"/>
+          <p:cNvSpPr/>
+          <p:nvPr/>
+        </p:nvSpPr>
+        <p:spPr>
+          <a:xfrm>
+            <a:off x="3378331" y="1121314"/>
+            <a:ext cx="355340" cy="3859307"/>
+          </a:xfrm>
+          <a:prstGeom prst="rect">
+            <a:avLst/>
+          </a:prstGeom>
+          <a:solidFill>
+            <a:schemeClr val="bg1"/>
+          </a:solidFill>
+          <a:ln>
+            <a:noFill/>
+          </a:ln>
+        </p:spPr>
+        <p:style>
+          <a:lnRef idx="2">
+            <a:schemeClr val="accent1">
+              <a:shade val="50000"/>
+            </a:schemeClr>
+          </a:lnRef>
+          <a:fillRef idx="1">
+            <a:schemeClr val="accent1"/>
+          </a:fillRef>
+          <a:effectRef idx="0">
+            <a:schemeClr val="accent1"/>
+          </a:effectRef>
+          <a:fontRef idx="minor">
+            <a:schemeClr val="lt1"/>
+          </a:fontRef>
+        </p:style>
+        <p:txBody>
+          <a:bodyPr rtlCol="0" anchor="ctr"/>
+          <a:lstStyle/>
+          <a:p>
+            <a:pPr algn="ctr"/>
+            <a:endParaRPr lang="en-GB"/>
+          </a:p>
+        </p:txBody>
+      </p:sp>
+      <p:sp>
+        <p:nvSpPr>
+          <p:cNvPr id="6" name="TextBox 5"/>
+          <p:cNvSpPr txBox="1"/>
+          <p:nvPr/>
+        </p:nvSpPr>
+        <p:spPr>
+          <a:xfrm rot="16200000">
+            <a:off x="2518423" y="4153123"/>
+            <a:ext cx="1574124" cy="276999"/>
+          </a:xfrm>
+          <a:prstGeom prst="rect">
+            <a:avLst/>
+          </a:prstGeom>
+          <a:noFill/>
+        </p:spPr>
+        <p:txBody>
+          <a:bodyPr wrap="square" rtlCol="0">
+            <a:spAutoFit/>
+          </a:bodyPr>
+          <a:lstStyle/>
+          <a:p>
+            <a:pPr algn="ctr"/>
+            <a:r>
+              <a:rPr lang="en-GB" sz="1200" b="1" dirty="0" smtClean="0">
+                <a:latin typeface="CMU Serif Roman" charset="0"/>
+                <a:ea typeface="CMU Serif Roman" charset="0"/>
+                <a:cs typeface="CMU Serif Roman" charset="0"/>
+              </a:rPr>
+              <a:t>EBVhost</a:t>
+            </a:r>
+            <a:endParaRPr lang="en-GB" sz="1200" b="1" dirty="0">
+              <a:latin typeface="CMU Serif Roman" charset="0"/>
+              <a:ea typeface="CMU Serif Roman" charset="0"/>
+              <a:cs typeface="CMU Serif Roman" charset="0"/>
+            </a:endParaRPr>
+          </a:p>
+        </p:txBody>
+      </p:sp>
+      <p:sp>
+        <p:nvSpPr>
+          <p:cNvPr id="7" name="TextBox 6"/>
+          <p:cNvSpPr txBox="1"/>
+          <p:nvPr/>
+        </p:nvSpPr>
+        <p:spPr>
+          <a:xfrm>
+            <a:off x="3791595" y="5229370"/>
+            <a:ext cx="1574124" cy="276999"/>
+          </a:xfrm>
+          <a:prstGeom prst="rect">
+            <a:avLst/>
+          </a:prstGeom>
+          <a:noFill/>
+        </p:spPr>
+        <p:txBody>
+          <a:bodyPr wrap="square" rtlCol="0">
+            <a:spAutoFit/>
+          </a:bodyPr>
+          <a:lstStyle/>
+          <a:p>
+            <a:pPr algn="ctr"/>
+            <a:r>
+              <a:rPr lang="en-GB" sz="1200" b="1" dirty="0" smtClean="0">
+                <a:latin typeface="CMU Serif Roman" charset="0"/>
+                <a:ea typeface="CMU Serif Roman" charset="0"/>
+                <a:cs typeface="CMU Serif Roman" charset="0"/>
+              </a:rPr>
+              <a:t>DM </a:t>
+            </a:r>
+            <a:r>
+              <a:rPr lang="en-GB" sz="1200" b="1" dirty="0" smtClean="0">
+                <a:latin typeface="CMU Serif Roman" charset="0"/>
+                <a:ea typeface="CMU Serif Roman" charset="0"/>
+                <a:cs typeface="CMU Serif Roman" charset="0"/>
+              </a:rPr>
+              <a:t>(mag)</a:t>
+            </a:r>
+            <a:endParaRPr lang="en-GB" sz="1200" b="1" dirty="0">
+              <a:latin typeface="CMU Serif Roman" charset="0"/>
+              <a:ea typeface="CMU Serif Roman" charset="0"/>
+              <a:cs typeface="CMU Serif Roman" charset="0"/>
+            </a:endParaRPr>
+          </a:p>
+        </p:txBody>
+      </p:sp>
+      <p:sp>
+        <p:nvSpPr>
+          <p:cNvPr id="8" name="TextBox 7"/>
+          <p:cNvSpPr txBox="1"/>
+          <p:nvPr/>
+        </p:nvSpPr>
+        <p:spPr>
+          <a:xfrm>
+            <a:off x="5440196" y="5229369"/>
+            <a:ext cx="1574124" cy="276999"/>
+          </a:xfrm>
+          <a:prstGeom prst="rect">
+            <a:avLst/>
+          </a:prstGeom>
+          <a:noFill/>
+        </p:spPr>
+        <p:txBody>
+          <a:bodyPr wrap="square" rtlCol="0">
+            <a:spAutoFit/>
+          </a:bodyPr>
+          <a:lstStyle/>
+          <a:p>
+            <a:pPr algn="ctr"/>
+            <a:r>
+              <a:rPr lang="en-GB" sz="1200" b="1" dirty="0" smtClean="0">
+                <a:latin typeface="CMU Serif Roman" charset="0"/>
+                <a:ea typeface="CMU Serif Roman" charset="0"/>
+                <a:cs typeface="CMU Serif Roman" charset="0"/>
+              </a:rPr>
+              <a:t>dm15</a:t>
+            </a:r>
+            <a:endParaRPr lang="en-GB" sz="1200" b="1" dirty="0">
+              <a:latin typeface="CMU Serif Roman" charset="0"/>
+              <a:ea typeface="CMU Serif Roman" charset="0"/>
+              <a:cs typeface="CMU Serif Roman" charset="0"/>
+            </a:endParaRPr>
+          </a:p>
+        </p:txBody>
+      </p:sp>
+      <p:sp>
+        <p:nvSpPr>
+          <p:cNvPr id="9" name="TextBox 8"/>
+          <p:cNvSpPr txBox="1"/>
+          <p:nvPr/>
+        </p:nvSpPr>
+        <p:spPr>
+          <a:xfrm rot="19200000">
+            <a:off x="3653534" y="4938114"/>
+            <a:ext cx="583699" cy="276999"/>
+          </a:xfrm>
+          <a:prstGeom prst="rect">
+            <a:avLst/>
+          </a:prstGeom>
+          <a:noFill/>
+        </p:spPr>
+        <p:txBody>
+          <a:bodyPr wrap="square" rtlCol="0">
+            <a:spAutoFit/>
+          </a:bodyPr>
+          <a:lstStyle/>
+          <a:p>
+            <a:pPr algn="ctr"/>
+            <a:r>
+              <a:rPr lang="en-GB" sz="1200" b="1" dirty="0" smtClean="0">
+                <a:latin typeface="CMU Serif" charset="0"/>
+                <a:ea typeface="CMU Serif" charset="0"/>
+                <a:cs typeface="CMU Serif" charset="0"/>
+              </a:rPr>
+              <a:t>35.75</a:t>
+            </a:r>
+            <a:endParaRPr lang="en-GB" sz="1200" b="1" dirty="0">
+              <a:latin typeface="CMU Serif" charset="0"/>
+              <a:ea typeface="CMU Serif" charset="0"/>
+              <a:cs typeface="CMU Serif" charset="0"/>
+            </a:endParaRPr>
+          </a:p>
+        </p:txBody>
+      </p:sp>
+      <p:sp>
+        <p:nvSpPr>
+          <p:cNvPr id="10" name="TextBox 9"/>
+          <p:cNvSpPr txBox="1"/>
+          <p:nvPr/>
+        </p:nvSpPr>
+        <p:spPr>
+          <a:xfrm rot="19200000">
+            <a:off x="4050223" y="4938250"/>
+            <a:ext cx="583699" cy="276999"/>
+          </a:xfrm>
+          <a:prstGeom prst="rect">
+            <a:avLst/>
+          </a:prstGeom>
+          <a:noFill/>
+        </p:spPr>
+        <p:txBody>
+          <a:bodyPr wrap="square" rtlCol="0">
+            <a:spAutoFit/>
+          </a:bodyPr>
+          <a:lstStyle/>
+          <a:p>
+            <a:pPr algn="ctr"/>
+            <a:r>
+              <a:rPr lang="en-GB" sz="1200" b="1" dirty="0" smtClean="0">
+                <a:latin typeface="CMU Serif" charset="0"/>
+                <a:ea typeface="CMU Serif" charset="0"/>
+                <a:cs typeface="CMU Serif" charset="0"/>
+              </a:rPr>
+              <a:t>36.00</a:t>
+            </a:r>
+          </a:p>
+        </p:txBody>
+      </p:sp>
+      <p:sp>
+        <p:nvSpPr>
+          <p:cNvPr id="11" name="TextBox 10"/>
+          <p:cNvSpPr txBox="1"/>
+          <p:nvPr/>
+        </p:nvSpPr>
+        <p:spPr>
+          <a:xfrm rot="19200000">
+            <a:off x="3289615" y="3623600"/>
+            <a:ext cx="583699" cy="276999"/>
+          </a:xfrm>
+          <a:prstGeom prst="rect">
+            <a:avLst/>
+          </a:prstGeom>
+          <a:noFill/>
+        </p:spPr>
+        <p:txBody>
+          <a:bodyPr wrap="square" rtlCol="0">
+            <a:spAutoFit/>
+          </a:bodyPr>
+          <a:lstStyle/>
+          <a:p>
+            <a:pPr algn="ctr"/>
+            <a:r>
+              <a:rPr lang="en-GB" sz="1200" b="1" dirty="0" smtClean="0">
+                <a:latin typeface="CMU Serif" charset="0"/>
+                <a:ea typeface="CMU Serif" charset="0"/>
+                <a:cs typeface="CMU Serif" charset="0"/>
+              </a:rPr>
+              <a:t>0.30</a:t>
+            </a:r>
+          </a:p>
+        </p:txBody>
+      </p:sp>
+      <p:sp>
+        <p:nvSpPr>
+          <p:cNvPr id="12" name="TextBox 11"/>
+          <p:cNvSpPr txBox="1"/>
+          <p:nvPr/>
+        </p:nvSpPr>
+        <p:spPr>
+          <a:xfrm rot="19200000">
+            <a:off x="3292625" y="3973235"/>
+            <a:ext cx="583699" cy="276999"/>
+          </a:xfrm>
+          <a:prstGeom prst="rect">
+            <a:avLst/>
+          </a:prstGeom>
+          <a:noFill/>
+        </p:spPr>
+        <p:txBody>
+          <a:bodyPr wrap="square" rtlCol="0">
+            <a:spAutoFit/>
+          </a:bodyPr>
+          <a:lstStyle/>
+          <a:p>
+            <a:pPr algn="ctr"/>
+            <a:r>
+              <a:rPr lang="en-GB" sz="1200" b="1" smtClean="0">
+                <a:latin typeface="CMU Serif" charset="0"/>
+                <a:ea typeface="CMU Serif" charset="0"/>
+                <a:cs typeface="CMU Serif" charset="0"/>
+              </a:rPr>
+              <a:t>0.15</a:t>
+            </a:r>
+          </a:p>
+        </p:txBody>
+      </p:sp>
+      <p:sp>
+        <p:nvSpPr>
+          <p:cNvPr id="13" name="TextBox 12"/>
+          <p:cNvSpPr txBox="1"/>
+          <p:nvPr/>
+        </p:nvSpPr>
+        <p:spPr>
+          <a:xfrm rot="19200000">
+            <a:off x="4455262" y="4938114"/>
+            <a:ext cx="583699" cy="276999"/>
+          </a:xfrm>
+          <a:prstGeom prst="rect">
+            <a:avLst/>
+          </a:prstGeom>
+          <a:noFill/>
+        </p:spPr>
+        <p:txBody>
+          <a:bodyPr wrap="square" rtlCol="0">
+            <a:spAutoFit/>
+          </a:bodyPr>
+          <a:lstStyle/>
+          <a:p>
+            <a:pPr algn="ctr"/>
+            <a:r>
+              <a:rPr lang="en-GB" sz="1200" b="1" smtClean="0">
+                <a:latin typeface="CMU Serif" charset="0"/>
+                <a:ea typeface="CMU Serif" charset="0"/>
+                <a:cs typeface="CMU Serif" charset="0"/>
+              </a:rPr>
+              <a:t>36.25</a:t>
+            </a:r>
+            <a:endParaRPr lang="en-GB" sz="1200" b="1" dirty="0" smtClean="0">
+              <a:latin typeface="CMU Serif" charset="0"/>
+              <a:ea typeface="CMU Serif" charset="0"/>
+              <a:cs typeface="CMU Serif" charset="0"/>
+            </a:endParaRPr>
+          </a:p>
+        </p:txBody>
+      </p:sp>
+      <p:sp>
+        <p:nvSpPr>
+          <p:cNvPr id="14" name="TextBox 13"/>
+          <p:cNvSpPr txBox="1"/>
+          <p:nvPr/>
+        </p:nvSpPr>
+        <p:spPr>
+          <a:xfrm rot="19200000">
+            <a:off x="4835751" y="4937978"/>
+            <a:ext cx="583699" cy="276999"/>
+          </a:xfrm>
+          <a:prstGeom prst="rect">
+            <a:avLst/>
+          </a:prstGeom>
+          <a:noFill/>
+        </p:spPr>
+        <p:txBody>
+          <a:bodyPr wrap="square" rtlCol="0">
+            <a:spAutoFit/>
+          </a:bodyPr>
+          <a:lstStyle/>
+          <a:p>
+            <a:pPr algn="ctr"/>
+            <a:r>
+              <a:rPr lang="en-GB" sz="1200" b="1" dirty="0" smtClean="0">
+                <a:latin typeface="CMU Serif" charset="0"/>
+                <a:ea typeface="CMU Serif" charset="0"/>
+                <a:cs typeface="CMU Serif" charset="0"/>
+              </a:rPr>
+              <a:t>36.50</a:t>
+            </a:r>
+          </a:p>
+        </p:txBody>
+      </p:sp>
+      <p:sp>
+        <p:nvSpPr>
+          <p:cNvPr id="15" name="TextBox 14"/>
+          <p:cNvSpPr txBox="1"/>
+          <p:nvPr/>
+        </p:nvSpPr>
+        <p:spPr>
+          <a:xfrm rot="19200000">
+            <a:off x="3292743" y="4260989"/>
+            <a:ext cx="583699" cy="276999"/>
+          </a:xfrm>
+          <a:prstGeom prst="rect">
+            <a:avLst/>
+          </a:prstGeom>
+          <a:noFill/>
+        </p:spPr>
+        <p:txBody>
+          <a:bodyPr wrap="square" rtlCol="0">
+            <a:spAutoFit/>
+          </a:bodyPr>
+          <a:lstStyle/>
+          <a:p>
+            <a:pPr algn="ctr"/>
+            <a:r>
+              <a:rPr lang="en-GB" sz="1200" b="1" dirty="0" smtClean="0">
+                <a:latin typeface="CMU Serif" charset="0"/>
+                <a:ea typeface="CMU Serif" charset="0"/>
+                <a:cs typeface="CMU Serif" charset="0"/>
+              </a:rPr>
+              <a:t>0.00</a:t>
+            </a:r>
+          </a:p>
+        </p:txBody>
+      </p:sp>
+      <p:sp>
+        <p:nvSpPr>
+          <p:cNvPr id="16" name="TextBox 15"/>
+          <p:cNvSpPr txBox="1"/>
+          <p:nvPr/>
+        </p:nvSpPr>
+        <p:spPr>
+          <a:xfrm rot="19200000">
+            <a:off x="3270516" y="4616603"/>
+            <a:ext cx="583699" cy="276999"/>
+          </a:xfrm>
+          <a:prstGeom prst="rect">
+            <a:avLst/>
+          </a:prstGeom>
+          <a:noFill/>
+        </p:spPr>
+        <p:txBody>
+          <a:bodyPr wrap="square" rtlCol="0">
+            <a:spAutoFit/>
+          </a:bodyPr>
+          <a:lstStyle/>
+          <a:p>
+            <a:pPr algn="ctr"/>
+            <a:r>
+              <a:rPr lang="en-GB" sz="1200" b="1" smtClean="0">
+                <a:latin typeface="CMU Serif" charset="0"/>
+                <a:ea typeface="CMU Serif" charset="0"/>
+                <a:cs typeface="CMU Serif" charset="0"/>
+              </a:rPr>
+              <a:t>-0.15</a:t>
+            </a:r>
+            <a:endParaRPr lang="en-GB" sz="1200" b="1" dirty="0" smtClean="0">
+              <a:latin typeface="CMU Serif" charset="0"/>
+              <a:ea typeface="CMU Serif" charset="0"/>
+              <a:cs typeface="CMU Serif" charset="0"/>
+            </a:endParaRPr>
+          </a:p>
+        </p:txBody>
+      </p:sp>
+      <p:sp>
+        <p:nvSpPr>
+          <p:cNvPr id="17" name="TextBox 16"/>
+          <p:cNvSpPr txBox="1"/>
+          <p:nvPr/>
+        </p:nvSpPr>
+        <p:spPr>
+          <a:xfrm rot="19200000">
+            <a:off x="5342219" y="4864552"/>
+            <a:ext cx="583699" cy="461665"/>
+          </a:xfrm>
+          <a:prstGeom prst="rect">
+            <a:avLst/>
+          </a:prstGeom>
+          <a:noFill/>
+        </p:spPr>
+        <p:txBody>
+          <a:bodyPr wrap="square" rtlCol="0">
+            <a:spAutoFit/>
+          </a:bodyPr>
+          <a:lstStyle/>
+          <a:p>
+            <a:pPr algn="ctr"/>
+            <a:r>
+              <a:rPr lang="en-GB" sz="1200" b="1" dirty="0" smtClean="0">
+                <a:latin typeface="CMU Serif" charset="0"/>
+                <a:ea typeface="CMU Serif" charset="0"/>
+                <a:cs typeface="CMU Serif" charset="0"/>
+              </a:rPr>
+              <a:t>0.6</a:t>
+            </a:r>
+          </a:p>
+          <a:p>
+            <a:pPr algn="ctr"/>
+            <a:endParaRPr lang="en-GB" sz="1200" b="1" dirty="0" smtClean="0">
+              <a:latin typeface="CMU Serif" charset="0"/>
+              <a:ea typeface="CMU Serif" charset="0"/>
+              <a:cs typeface="CMU Serif" charset="0"/>
+            </a:endParaRPr>
+          </a:p>
+        </p:txBody>
+      </p:sp>
+      <p:sp>
+        <p:nvSpPr>
+          <p:cNvPr id="18" name="TextBox 17"/>
+          <p:cNvSpPr txBox="1"/>
+          <p:nvPr/>
+        </p:nvSpPr>
+        <p:spPr>
+          <a:xfrm rot="19200000">
+            <a:off x="5811606" y="4864551"/>
+            <a:ext cx="482395" cy="461665"/>
+          </a:xfrm>
+          <a:prstGeom prst="rect">
+            <a:avLst/>
+          </a:prstGeom>
+          <a:noFill/>
+        </p:spPr>
+        <p:txBody>
+          <a:bodyPr wrap="square" rtlCol="0">
+            <a:spAutoFit/>
+          </a:bodyPr>
+          <a:lstStyle/>
+          <a:p>
+            <a:pPr algn="ctr"/>
+            <a:r>
+              <a:rPr lang="en-GB" sz="1200" b="1" dirty="0" smtClean="0">
+                <a:latin typeface="CMU Serif" charset="0"/>
+                <a:ea typeface="CMU Serif" charset="0"/>
+                <a:cs typeface="CMU Serif" charset="0"/>
+              </a:rPr>
+              <a:t>0.8</a:t>
+            </a:r>
+          </a:p>
+          <a:p>
+            <a:pPr algn="ctr"/>
+            <a:endParaRPr lang="en-GB" sz="1200" b="1" dirty="0" smtClean="0">
+              <a:latin typeface="CMU Serif" charset="0"/>
+              <a:ea typeface="CMU Serif" charset="0"/>
+              <a:cs typeface="CMU Serif" charset="0"/>
+            </a:endParaRPr>
+          </a:p>
+        </p:txBody>
+      </p:sp>
+      <p:sp>
+        <p:nvSpPr>
+          <p:cNvPr id="19" name="TextBox 18"/>
+          <p:cNvSpPr txBox="1"/>
+          <p:nvPr/>
+        </p:nvSpPr>
+        <p:spPr>
+          <a:xfrm rot="19200000">
+            <a:off x="6227928" y="4864928"/>
+            <a:ext cx="482395" cy="461665"/>
+          </a:xfrm>
+          <a:prstGeom prst="rect">
+            <a:avLst/>
+          </a:prstGeom>
+          <a:noFill/>
+        </p:spPr>
+        <p:txBody>
+          <a:bodyPr wrap="square" rtlCol="0">
+            <a:spAutoFit/>
+          </a:bodyPr>
+          <a:lstStyle/>
+          <a:p>
+            <a:pPr algn="ctr"/>
+            <a:r>
+              <a:rPr lang="en-GB" sz="1200" b="1" smtClean="0">
+                <a:latin typeface="CMU Serif" charset="0"/>
+                <a:ea typeface="CMU Serif" charset="0"/>
+                <a:cs typeface="CMU Serif" charset="0"/>
+              </a:rPr>
+              <a:t>1.0</a:t>
+            </a:r>
+            <a:endParaRPr lang="en-GB" sz="1200" b="1" dirty="0" smtClean="0">
+              <a:latin typeface="CMU Serif" charset="0"/>
+              <a:ea typeface="CMU Serif" charset="0"/>
+              <a:cs typeface="CMU Serif" charset="0"/>
+            </a:endParaRPr>
+          </a:p>
+          <a:p>
+            <a:pPr algn="ctr"/>
+            <a:endParaRPr lang="en-GB" sz="1200" b="1" dirty="0" smtClean="0">
+              <a:latin typeface="CMU Serif" charset="0"/>
+              <a:ea typeface="CMU Serif" charset="0"/>
+              <a:cs typeface="CMU Serif" charset="0"/>
+            </a:endParaRPr>
+          </a:p>
+        </p:txBody>
+      </p:sp>
+      <p:sp>
+        <p:nvSpPr>
+          <p:cNvPr id="20" name="TextBox 19"/>
+          <p:cNvSpPr txBox="1"/>
+          <p:nvPr/>
+        </p:nvSpPr>
+        <p:spPr>
+          <a:xfrm rot="19200000">
+            <a:off x="6649841" y="4864552"/>
+            <a:ext cx="482395" cy="461665"/>
+          </a:xfrm>
+          <a:prstGeom prst="rect">
+            <a:avLst/>
+          </a:prstGeom>
+          <a:noFill/>
+        </p:spPr>
+        <p:txBody>
+          <a:bodyPr wrap="square" rtlCol="0">
+            <a:spAutoFit/>
+          </a:bodyPr>
+          <a:lstStyle/>
+          <a:p>
+            <a:pPr algn="ctr"/>
+            <a:r>
+              <a:rPr lang="en-GB" sz="1200" b="1" dirty="0" smtClean="0">
+                <a:latin typeface="CMU Serif" charset="0"/>
+                <a:ea typeface="CMU Serif" charset="0"/>
+                <a:cs typeface="CMU Serif" charset="0"/>
+              </a:rPr>
+              <a:t>1.2</a:t>
+            </a:r>
+          </a:p>
+          <a:p>
+            <a:pPr algn="ctr"/>
+            <a:endParaRPr lang="en-GB" sz="1200" b="1" dirty="0" smtClean="0">
+              <a:latin typeface="CMU Serif" charset="0"/>
+              <a:ea typeface="CMU Serif" charset="0"/>
+              <a:cs typeface="CMU Serif" charset="0"/>
+            </a:endParaRPr>
+          </a:p>
+        </p:txBody>
+      </p:sp>
+      <p:sp>
+        <p:nvSpPr>
+          <p:cNvPr id="21" name="TextBox 20"/>
+          <p:cNvSpPr txBox="1"/>
+          <p:nvPr/>
+        </p:nvSpPr>
+        <p:spPr>
+          <a:xfrm rot="19200000">
+            <a:off x="3340938" y="3239620"/>
+            <a:ext cx="583699" cy="276999"/>
+          </a:xfrm>
+          <a:prstGeom prst="rect">
+            <a:avLst/>
+          </a:prstGeom>
+          <a:noFill/>
+        </p:spPr>
+        <p:txBody>
+          <a:bodyPr wrap="square" rtlCol="0">
+            <a:spAutoFit/>
+          </a:bodyPr>
+          <a:lstStyle/>
+          <a:p>
+            <a:pPr algn="ctr"/>
+            <a:r>
+              <a:rPr lang="en-GB" sz="1200" b="1" smtClean="0">
+                <a:latin typeface="CMU Serif" charset="0"/>
+                <a:ea typeface="CMU Serif" charset="0"/>
+                <a:cs typeface="CMU Serif" charset="0"/>
+              </a:rPr>
+              <a:t>-2</a:t>
+            </a:r>
+            <a:endParaRPr lang="en-GB" sz="1200" b="1" dirty="0" smtClean="0">
+              <a:latin typeface="CMU Serif" charset="0"/>
+              <a:ea typeface="CMU Serif" charset="0"/>
+              <a:cs typeface="CMU Serif" charset="0"/>
+            </a:endParaRPr>
+          </a:p>
+        </p:txBody>
+      </p:sp>
+      <p:sp>
+        <p:nvSpPr>
+          <p:cNvPr id="22" name="TextBox 21"/>
+          <p:cNvSpPr txBox="1"/>
+          <p:nvPr/>
+        </p:nvSpPr>
+        <p:spPr>
+          <a:xfrm rot="19200000">
+            <a:off x="3357076" y="2965338"/>
+            <a:ext cx="583699" cy="276999"/>
+          </a:xfrm>
+          <a:prstGeom prst="rect">
+            <a:avLst/>
+          </a:prstGeom>
+          <a:noFill/>
+        </p:spPr>
+        <p:txBody>
+          <a:bodyPr wrap="square" rtlCol="0">
+            <a:spAutoFit/>
+          </a:bodyPr>
+          <a:lstStyle/>
+          <a:p>
+            <a:pPr algn="ctr"/>
+            <a:r>
+              <a:rPr lang="en-GB" sz="1200" b="1" smtClean="0">
+                <a:latin typeface="CMU Serif" charset="0"/>
+                <a:ea typeface="CMU Serif" charset="0"/>
+                <a:cs typeface="CMU Serif" charset="0"/>
+              </a:rPr>
+              <a:t>0</a:t>
+            </a:r>
+            <a:endParaRPr lang="en-GB" sz="1200" b="1" dirty="0" smtClean="0">
+              <a:latin typeface="CMU Serif" charset="0"/>
+              <a:ea typeface="CMU Serif" charset="0"/>
+              <a:cs typeface="CMU Serif" charset="0"/>
+            </a:endParaRPr>
+          </a:p>
+        </p:txBody>
+      </p:sp>
+      <p:sp>
+        <p:nvSpPr>
+          <p:cNvPr id="23" name="TextBox 22"/>
+          <p:cNvSpPr txBox="1"/>
+          <p:nvPr/>
+        </p:nvSpPr>
+        <p:spPr>
+          <a:xfrm rot="19200000">
+            <a:off x="3360737" y="2716915"/>
+            <a:ext cx="583699" cy="276999"/>
+          </a:xfrm>
+          <a:prstGeom prst="rect">
+            <a:avLst/>
+          </a:prstGeom>
+          <a:noFill/>
+        </p:spPr>
+        <p:txBody>
+          <a:bodyPr wrap="square" rtlCol="0">
+            <a:spAutoFit/>
+          </a:bodyPr>
+          <a:lstStyle/>
+          <a:p>
+            <a:pPr algn="ctr"/>
+            <a:r>
+              <a:rPr lang="en-GB" sz="1200" b="1">
+                <a:latin typeface="CMU Serif" charset="0"/>
+                <a:ea typeface="CMU Serif" charset="0"/>
+                <a:cs typeface="CMU Serif" charset="0"/>
+              </a:rPr>
+              <a:t>2</a:t>
+            </a:r>
+            <a:endParaRPr lang="en-GB" sz="1200" b="1" dirty="0" smtClean="0">
+              <a:latin typeface="CMU Serif" charset="0"/>
+              <a:ea typeface="CMU Serif" charset="0"/>
+              <a:cs typeface="CMU Serif" charset="0"/>
+            </a:endParaRPr>
+          </a:p>
+        </p:txBody>
+      </p:sp>
+      <p:sp>
+        <p:nvSpPr>
+          <p:cNvPr id="24" name="TextBox 23"/>
+          <p:cNvSpPr txBox="1"/>
+          <p:nvPr/>
+        </p:nvSpPr>
+        <p:spPr>
+          <a:xfrm rot="19200000">
+            <a:off x="3355060" y="2479373"/>
+            <a:ext cx="583699" cy="276999"/>
+          </a:xfrm>
+          <a:prstGeom prst="rect">
+            <a:avLst/>
+          </a:prstGeom>
+          <a:noFill/>
+        </p:spPr>
+        <p:txBody>
+          <a:bodyPr wrap="square" rtlCol="0">
+            <a:spAutoFit/>
+          </a:bodyPr>
+          <a:lstStyle/>
+          <a:p>
+            <a:pPr algn="ctr"/>
+            <a:r>
+              <a:rPr lang="en-GB" sz="1200" b="1" smtClean="0">
+                <a:latin typeface="CMU Serif" charset="0"/>
+                <a:ea typeface="CMU Serif" charset="0"/>
+                <a:cs typeface="CMU Serif" charset="0"/>
+              </a:rPr>
+              <a:t>4</a:t>
+            </a:r>
+            <a:endParaRPr lang="en-GB" sz="1200" b="1" dirty="0" smtClean="0">
+              <a:latin typeface="CMU Serif" charset="0"/>
+              <a:ea typeface="CMU Serif" charset="0"/>
+              <a:cs typeface="CMU Serif" charset="0"/>
+            </a:endParaRPr>
+          </a:p>
+        </p:txBody>
+      </p:sp>
+      <p:sp>
+        <p:nvSpPr>
+          <p:cNvPr id="25" name="TextBox 24"/>
+          <p:cNvSpPr txBox="1"/>
+          <p:nvPr/>
+        </p:nvSpPr>
+        <p:spPr>
+          <a:xfrm rot="16200000">
+            <a:off x="2518423" y="2920705"/>
+            <a:ext cx="1574124" cy="276999"/>
+          </a:xfrm>
+          <a:prstGeom prst="rect">
+            <a:avLst/>
+          </a:prstGeom>
+          <a:noFill/>
+        </p:spPr>
+        <p:txBody>
+          <a:bodyPr wrap="square" rtlCol="0">
+            <a:spAutoFit/>
+          </a:bodyPr>
+          <a:lstStyle/>
+          <a:p>
+            <a:pPr algn="ctr"/>
+            <a:r>
+              <a:rPr lang="en-GB" sz="1200" b="1" dirty="0" smtClean="0">
+                <a:latin typeface="CMU Serif Roman" charset="0"/>
+                <a:ea typeface="CMU Serif Roman" charset="0"/>
+                <a:cs typeface="CMU Serif Roman" charset="0"/>
+              </a:rPr>
+              <a:t>Tmax</a:t>
+            </a:r>
+            <a:endParaRPr lang="en-GB" sz="1200" b="1" dirty="0">
+              <a:latin typeface="CMU Serif Roman" charset="0"/>
+              <a:ea typeface="CMU Serif Roman" charset="0"/>
+              <a:cs typeface="CMU Serif Roman" charset="0"/>
+            </a:endParaRPr>
+          </a:p>
+        </p:txBody>
+      </p:sp>
+      <p:sp>
+        <p:nvSpPr>
+          <p:cNvPr id="26" name="Rectangle 25"/>
+          <p:cNvSpPr/>
+          <p:nvPr/>
+        </p:nvSpPr>
+        <p:spPr>
+          <a:xfrm>
+            <a:off x="3791810" y="1060846"/>
+            <a:ext cx="1648386" cy="85046"/>
+          </a:xfrm>
+          <a:prstGeom prst="rect">
+            <a:avLst/>
+          </a:prstGeom>
+          <a:solidFill>
+            <a:schemeClr val="bg1"/>
+          </a:solidFill>
+          <a:ln>
+            <a:noFill/>
+          </a:ln>
+        </p:spPr>
+        <p:style>
+          <a:lnRef idx="2">
+            <a:schemeClr val="accent1">
+              <a:shade val="50000"/>
+            </a:schemeClr>
+          </a:lnRef>
+          <a:fillRef idx="1">
+            <a:schemeClr val="accent1"/>
+          </a:fillRef>
+          <a:effectRef idx="0">
+            <a:schemeClr val="accent1"/>
+          </a:effectRef>
+          <a:fontRef idx="minor">
+            <a:schemeClr val="lt1"/>
+          </a:fontRef>
+        </p:style>
+        <p:txBody>
+          <a:bodyPr rtlCol="0" anchor="ctr"/>
+          <a:lstStyle/>
+          <a:p>
+            <a:pPr algn="ctr"/>
+            <a:endParaRPr lang="en-GB"/>
+          </a:p>
+        </p:txBody>
+      </p:sp>
+      <p:sp>
+        <p:nvSpPr>
+          <p:cNvPr id="28" name="Rectangle 27"/>
+          <p:cNvSpPr/>
+          <p:nvPr/>
+        </p:nvSpPr>
+        <p:spPr>
+          <a:xfrm>
+            <a:off x="8815295" y="3981109"/>
+            <a:ext cx="45719" cy="913621"/>
+          </a:xfrm>
+          <a:prstGeom prst="rect">
+            <a:avLst/>
+          </a:prstGeom>
+          <a:solidFill>
+            <a:schemeClr val="bg1"/>
+          </a:solidFill>
+          <a:ln>
+            <a:noFill/>
+          </a:ln>
+        </p:spPr>
+        <p:style>
+          <a:lnRef idx="2">
+            <a:schemeClr val="accent1">
+              <a:shade val="50000"/>
+            </a:schemeClr>
+          </a:lnRef>
+          <a:fillRef idx="1">
+            <a:schemeClr val="accent1"/>
+          </a:fillRef>
+          <a:effectRef idx="0">
+            <a:schemeClr val="accent1"/>
+          </a:effectRef>
+          <a:fontRef idx="minor">
+            <a:schemeClr val="lt1"/>
+          </a:fontRef>
+        </p:style>
+        <p:txBody>
+          <a:bodyPr rtlCol="0" anchor="ctr"/>
+          <a:lstStyle/>
+          <a:p>
+            <a:pPr algn="ctr"/>
+            <a:endParaRPr lang="en-GB"/>
+          </a:p>
+        </p:txBody>
+      </p:sp>
+      <p:sp>
+        <p:nvSpPr>
+          <p:cNvPr id="31" name="Rectangle 30"/>
+          <p:cNvSpPr/>
+          <p:nvPr/>
+        </p:nvSpPr>
+        <p:spPr>
+          <a:xfrm>
+            <a:off x="5415732" y="1121906"/>
+            <a:ext cx="1995796" cy="1276296"/>
+          </a:xfrm>
+          <a:prstGeom prst="rect">
+            <a:avLst/>
+          </a:prstGeom>
+          <a:solidFill>
+            <a:schemeClr val="bg1"/>
+          </a:solidFill>
+          <a:ln>
+            <a:noFill/>
+          </a:ln>
+        </p:spPr>
+        <p:style>
+          <a:lnRef idx="2">
+            <a:schemeClr val="accent1">
+              <a:shade val="50000"/>
+            </a:schemeClr>
+          </a:lnRef>
+          <a:fillRef idx="1">
+            <a:schemeClr val="accent1"/>
+          </a:fillRef>
+          <a:effectRef idx="0">
+            <a:schemeClr val="accent1"/>
+          </a:effectRef>
+          <a:fontRef idx="minor">
+            <a:schemeClr val="lt1"/>
+          </a:fontRef>
+        </p:style>
+        <p:txBody>
+          <a:bodyPr rtlCol="0" anchor="ctr"/>
+          <a:lstStyle/>
+          <a:p>
+            <a:pPr algn="ctr"/>
+            <a:endParaRPr lang="en-GB"/>
+          </a:p>
+        </p:txBody>
+      </p:sp>
+      <p:sp>
+        <p:nvSpPr>
+          <p:cNvPr id="32" name="Rectangle 31"/>
+          <p:cNvSpPr/>
+          <p:nvPr/>
+        </p:nvSpPr>
+        <p:spPr>
+          <a:xfrm>
+            <a:off x="7116985" y="2365660"/>
+            <a:ext cx="1769435" cy="1276296"/>
+          </a:xfrm>
+          <a:prstGeom prst="rect">
+            <a:avLst/>
+          </a:prstGeom>
+          <a:solidFill>
+            <a:schemeClr val="bg1"/>
+          </a:solidFill>
+          <a:ln>
+            <a:noFill/>
+          </a:ln>
+        </p:spPr>
+        <p:style>
+          <a:lnRef idx="2">
+            <a:schemeClr val="accent1">
+              <a:shade val="50000"/>
+            </a:schemeClr>
+          </a:lnRef>
+          <a:fillRef idx="1">
+            <a:schemeClr val="accent1"/>
+          </a:fillRef>
+          <a:effectRef idx="0">
+            <a:schemeClr val="accent1"/>
+          </a:effectRef>
+          <a:fontRef idx="minor">
+            <a:schemeClr val="lt1"/>
+          </a:fontRef>
+        </p:style>
+        <p:txBody>
+          <a:bodyPr rtlCol="0" anchor="ctr"/>
+          <a:lstStyle/>
+          <a:p>
+            <a:pPr algn="ctr"/>
+            <a:endParaRPr lang="en-GB"/>
+          </a:p>
+        </p:txBody>
+      </p:sp>
+      <p:sp>
+        <p:nvSpPr>
+          <p:cNvPr id="33" name="TextBox 32"/>
+          <p:cNvSpPr txBox="1"/>
+          <p:nvPr/>
+        </p:nvSpPr>
+        <p:spPr>
+          <a:xfrm rot="19200000">
+            <a:off x="7215141" y="4862228"/>
+            <a:ext cx="583699" cy="276999"/>
+          </a:xfrm>
+          <a:prstGeom prst="rect">
+            <a:avLst/>
+          </a:prstGeom>
+          <a:noFill/>
+        </p:spPr>
+        <p:txBody>
+          <a:bodyPr wrap="square" rtlCol="0">
+            <a:spAutoFit/>
+          </a:bodyPr>
+          <a:lstStyle/>
+          <a:p>
+            <a:pPr algn="ctr"/>
+            <a:r>
+              <a:rPr lang="en-GB" sz="1200" b="1" smtClean="0">
+                <a:latin typeface="CMU Serif" charset="0"/>
+                <a:ea typeface="CMU Serif" charset="0"/>
+                <a:cs typeface="CMU Serif" charset="0"/>
+              </a:rPr>
+              <a:t>-2</a:t>
+            </a:r>
+            <a:endParaRPr lang="en-GB" sz="1200" b="1" dirty="0" smtClean="0">
+              <a:latin typeface="CMU Serif" charset="0"/>
+              <a:ea typeface="CMU Serif" charset="0"/>
+              <a:cs typeface="CMU Serif" charset="0"/>
+            </a:endParaRPr>
+          </a:p>
+        </p:txBody>
+      </p:sp>
+      <p:sp>
+        <p:nvSpPr>
+          <p:cNvPr id="34" name="TextBox 33"/>
+          <p:cNvSpPr txBox="1"/>
+          <p:nvPr/>
+        </p:nvSpPr>
+        <p:spPr>
+          <a:xfrm rot="19200000">
+            <a:off x="7583648" y="4850529"/>
+            <a:ext cx="583699" cy="276999"/>
+          </a:xfrm>
+          <a:prstGeom prst="rect">
+            <a:avLst/>
+          </a:prstGeom>
+          <a:noFill/>
+        </p:spPr>
+        <p:txBody>
+          <a:bodyPr wrap="square" rtlCol="0">
+            <a:spAutoFit/>
+          </a:bodyPr>
+          <a:lstStyle/>
+          <a:p>
+            <a:pPr algn="ctr"/>
+            <a:r>
+              <a:rPr lang="en-GB" sz="1200" b="1" smtClean="0">
+                <a:latin typeface="CMU Serif" charset="0"/>
+                <a:ea typeface="CMU Serif" charset="0"/>
+                <a:cs typeface="CMU Serif" charset="0"/>
+              </a:rPr>
+              <a:t>0</a:t>
+            </a:r>
+            <a:endParaRPr lang="en-GB" sz="1200" b="1" dirty="0" smtClean="0">
+              <a:latin typeface="CMU Serif" charset="0"/>
+              <a:ea typeface="CMU Serif" charset="0"/>
+              <a:cs typeface="CMU Serif" charset="0"/>
+            </a:endParaRPr>
+          </a:p>
+        </p:txBody>
+      </p:sp>
+      <p:sp>
+        <p:nvSpPr>
+          <p:cNvPr id="35" name="TextBox 34"/>
+          <p:cNvSpPr txBox="1"/>
+          <p:nvPr/>
+        </p:nvSpPr>
+        <p:spPr>
+          <a:xfrm rot="19200000">
+            <a:off x="7922372" y="4842122"/>
+            <a:ext cx="583699" cy="276999"/>
+          </a:xfrm>
+          <a:prstGeom prst="rect">
+            <a:avLst/>
+          </a:prstGeom>
+          <a:noFill/>
+        </p:spPr>
+        <p:txBody>
+          <a:bodyPr wrap="square" rtlCol="0">
+            <a:spAutoFit/>
+          </a:bodyPr>
+          <a:lstStyle/>
+          <a:p>
+            <a:pPr algn="ctr"/>
+            <a:r>
+              <a:rPr lang="en-GB" sz="1200" b="1">
+                <a:latin typeface="CMU Serif" charset="0"/>
+                <a:ea typeface="CMU Serif" charset="0"/>
+                <a:cs typeface="CMU Serif" charset="0"/>
+              </a:rPr>
+              <a:t>2</a:t>
+            </a:r>
+            <a:endParaRPr lang="en-GB" sz="1200" b="1" dirty="0" smtClean="0">
+              <a:latin typeface="CMU Serif" charset="0"/>
+              <a:ea typeface="CMU Serif" charset="0"/>
+              <a:cs typeface="CMU Serif" charset="0"/>
+            </a:endParaRPr>
+          </a:p>
+        </p:txBody>
+      </p:sp>
+      <p:sp>
+        <p:nvSpPr>
+          <p:cNvPr id="36" name="TextBox 35"/>
+          <p:cNvSpPr txBox="1"/>
+          <p:nvPr/>
+        </p:nvSpPr>
+        <p:spPr>
+          <a:xfrm rot="19200000">
+            <a:off x="8252672" y="4841908"/>
+            <a:ext cx="583699" cy="276999"/>
+          </a:xfrm>
+          <a:prstGeom prst="rect">
+            <a:avLst/>
+          </a:prstGeom>
+          <a:noFill/>
+        </p:spPr>
+        <p:txBody>
+          <a:bodyPr wrap="square" rtlCol="0">
+            <a:spAutoFit/>
+          </a:bodyPr>
+          <a:lstStyle/>
+          <a:p>
+            <a:pPr algn="ctr"/>
+            <a:r>
+              <a:rPr lang="en-GB" sz="1200" b="1" smtClean="0">
+                <a:latin typeface="CMU Serif" charset="0"/>
+                <a:ea typeface="CMU Serif" charset="0"/>
+                <a:cs typeface="CMU Serif" charset="0"/>
+              </a:rPr>
+              <a:t>4</a:t>
+            </a:r>
+            <a:endParaRPr lang="en-GB" sz="1200" b="1" dirty="0" smtClean="0">
+              <a:latin typeface="CMU Serif" charset="0"/>
+              <a:ea typeface="CMU Serif" charset="0"/>
+              <a:cs typeface="CMU Serif" charset="0"/>
+            </a:endParaRPr>
+          </a:p>
+        </p:txBody>
+      </p:sp>
+      <p:sp>
+        <p:nvSpPr>
+          <p:cNvPr id="37" name="TextBox 36"/>
+          <p:cNvSpPr txBox="1"/>
+          <p:nvPr/>
+        </p:nvSpPr>
+        <p:spPr>
+          <a:xfrm>
+            <a:off x="7186266" y="5228660"/>
+            <a:ext cx="1574124" cy="276999"/>
+          </a:xfrm>
+          <a:prstGeom prst="rect">
+            <a:avLst/>
+          </a:prstGeom>
+          <a:noFill/>
+        </p:spPr>
+        <p:txBody>
+          <a:bodyPr wrap="square" rtlCol="0">
+            <a:spAutoFit/>
+          </a:bodyPr>
+          <a:lstStyle/>
+          <a:p>
+            <a:pPr algn="ctr"/>
+            <a:r>
+              <a:rPr lang="en-GB" sz="1200" b="1" dirty="0" smtClean="0">
+                <a:latin typeface="CMU Serif Roman" charset="0"/>
+                <a:ea typeface="CMU Serif Roman" charset="0"/>
+                <a:cs typeface="CMU Serif Roman" charset="0"/>
+              </a:rPr>
+              <a:t>Tmax</a:t>
+            </a:r>
+            <a:endParaRPr lang="en-GB" sz="1200" b="1" dirty="0">
+              <a:latin typeface="CMU Serif Roman" charset="0"/>
+              <a:ea typeface="CMU Serif Roman" charset="0"/>
+              <a:cs typeface="CMU Serif Roman" charset="0"/>
+            </a:endParaRPr>
+          </a:p>
+        </p:txBody>
+      </p:sp>
+      <p:sp>
+        <p:nvSpPr>
+          <p:cNvPr id="38" name="TextBox 37"/>
+          <p:cNvSpPr txBox="1"/>
+          <p:nvPr/>
+        </p:nvSpPr>
+        <p:spPr>
+          <a:xfrm rot="16200000">
+            <a:off x="2591383" y="1646175"/>
+            <a:ext cx="1434463" cy="276999"/>
+          </a:xfrm>
+          <a:prstGeom prst="rect">
+            <a:avLst/>
+          </a:prstGeom>
+          <a:noFill/>
+        </p:spPr>
+        <p:txBody>
+          <a:bodyPr wrap="square" rtlCol="0">
+            <a:spAutoFit/>
+          </a:bodyPr>
+          <a:lstStyle/>
+          <a:p>
+            <a:pPr algn="ctr"/>
+            <a:r>
+              <a:rPr lang="en-GB" sz="1200" b="1" dirty="0" smtClean="0">
+                <a:latin typeface="CMU Serif Roman" charset="0"/>
+                <a:ea typeface="CMU Serif Roman" charset="0"/>
+                <a:cs typeface="CMU Serif Roman" charset="0"/>
+              </a:rPr>
+              <a:t>dm15</a:t>
+            </a:r>
+            <a:endParaRPr lang="en-GB" sz="1200" b="1" dirty="0">
+              <a:latin typeface="CMU Serif Roman" charset="0"/>
+              <a:ea typeface="CMU Serif Roman" charset="0"/>
+              <a:cs typeface="CMU Serif Roman" charset="0"/>
+            </a:endParaRPr>
+          </a:p>
+        </p:txBody>
+      </p:sp>
+      <p:sp>
+        <p:nvSpPr>
+          <p:cNvPr id="39" name="TextBox 38"/>
+          <p:cNvSpPr txBox="1"/>
+          <p:nvPr/>
+        </p:nvSpPr>
+        <p:spPr>
+          <a:xfrm rot="19200000">
+            <a:off x="3361310" y="2131727"/>
+            <a:ext cx="583699" cy="461665"/>
+          </a:xfrm>
+          <a:prstGeom prst="rect">
+            <a:avLst/>
+          </a:prstGeom>
+          <a:noFill/>
+        </p:spPr>
+        <p:txBody>
+          <a:bodyPr wrap="square" rtlCol="0">
+            <a:spAutoFit/>
+          </a:bodyPr>
+          <a:lstStyle/>
+          <a:p>
+            <a:pPr algn="ctr"/>
+            <a:r>
+              <a:rPr lang="en-GB" sz="1200" b="1" smtClean="0">
+                <a:latin typeface="CMU Serif" charset="0"/>
+                <a:ea typeface="CMU Serif" charset="0"/>
+                <a:cs typeface="CMU Serif" charset="0"/>
+              </a:rPr>
+              <a:t>0.6</a:t>
+            </a:r>
+          </a:p>
+          <a:p>
+            <a:pPr algn="ctr"/>
+            <a:endParaRPr lang="en-GB" sz="1200" b="1" dirty="0" smtClean="0">
+              <a:latin typeface="CMU Serif" charset="0"/>
+              <a:ea typeface="CMU Serif" charset="0"/>
+              <a:cs typeface="CMU Serif" charset="0"/>
+            </a:endParaRPr>
+          </a:p>
+        </p:txBody>
+      </p:sp>
+      <p:sp>
+        <p:nvSpPr>
+          <p:cNvPr id="40" name="TextBox 39"/>
+          <p:cNvSpPr txBox="1"/>
+          <p:nvPr/>
+        </p:nvSpPr>
+        <p:spPr>
+          <a:xfrm rot="19200000">
+            <a:off x="3405710" y="1826008"/>
+            <a:ext cx="482395" cy="461665"/>
+          </a:xfrm>
+          <a:prstGeom prst="rect">
+            <a:avLst/>
+          </a:prstGeom>
+          <a:noFill/>
+        </p:spPr>
+        <p:txBody>
+          <a:bodyPr wrap="square" rtlCol="0">
+            <a:spAutoFit/>
+          </a:bodyPr>
+          <a:lstStyle/>
+          <a:p>
+            <a:pPr algn="ctr"/>
+            <a:r>
+              <a:rPr lang="en-GB" sz="1200" b="1" dirty="0" smtClean="0">
+                <a:latin typeface="CMU Serif" charset="0"/>
+                <a:ea typeface="CMU Serif" charset="0"/>
+                <a:cs typeface="CMU Serif" charset="0"/>
+              </a:rPr>
+              <a:t>0.8</a:t>
+            </a:r>
+          </a:p>
+          <a:p>
+            <a:pPr algn="ctr"/>
+            <a:endParaRPr lang="en-GB" sz="1200" b="1" dirty="0" smtClean="0">
+              <a:latin typeface="CMU Serif" charset="0"/>
+              <a:ea typeface="CMU Serif" charset="0"/>
+              <a:cs typeface="CMU Serif" charset="0"/>
+            </a:endParaRPr>
+          </a:p>
+        </p:txBody>
+      </p:sp>
+      <p:sp>
+        <p:nvSpPr>
+          <p:cNvPr id="41" name="TextBox 40"/>
+          <p:cNvSpPr txBox="1"/>
+          <p:nvPr/>
+        </p:nvSpPr>
+        <p:spPr>
+          <a:xfrm rot="19200000">
+            <a:off x="3401714" y="1520935"/>
+            <a:ext cx="482395" cy="461665"/>
+          </a:xfrm>
+          <a:prstGeom prst="rect">
+            <a:avLst/>
+          </a:prstGeom>
+          <a:noFill/>
+        </p:spPr>
+        <p:txBody>
+          <a:bodyPr wrap="square" rtlCol="0">
+            <a:spAutoFit/>
+          </a:bodyPr>
+          <a:lstStyle/>
+          <a:p>
+            <a:pPr algn="ctr"/>
+            <a:r>
+              <a:rPr lang="en-GB" sz="1200" b="1" smtClean="0">
+                <a:latin typeface="CMU Serif" charset="0"/>
+                <a:ea typeface="CMU Serif" charset="0"/>
+                <a:cs typeface="CMU Serif" charset="0"/>
+              </a:rPr>
+              <a:t>1.0</a:t>
+            </a:r>
+            <a:endParaRPr lang="en-GB" sz="1200" b="1" dirty="0" smtClean="0">
+              <a:latin typeface="CMU Serif" charset="0"/>
+              <a:ea typeface="CMU Serif" charset="0"/>
+              <a:cs typeface="CMU Serif" charset="0"/>
+            </a:endParaRPr>
+          </a:p>
+          <a:p>
+            <a:pPr algn="ctr"/>
+            <a:endParaRPr lang="en-GB" sz="1200" b="1" dirty="0" smtClean="0">
+              <a:latin typeface="CMU Serif" charset="0"/>
+              <a:ea typeface="CMU Serif" charset="0"/>
+              <a:cs typeface="CMU Serif" charset="0"/>
+            </a:endParaRPr>
+          </a:p>
+        </p:txBody>
+      </p:sp>
+      <p:sp>
+        <p:nvSpPr>
+          <p:cNvPr id="42" name="TextBox 41"/>
+          <p:cNvSpPr txBox="1"/>
+          <p:nvPr/>
+        </p:nvSpPr>
+        <p:spPr>
+          <a:xfrm rot="19200000">
+            <a:off x="3349195" y="1196646"/>
+            <a:ext cx="482395" cy="461665"/>
+          </a:xfrm>
+          <a:prstGeom prst="rect">
+            <a:avLst/>
+          </a:prstGeom>
+          <a:noFill/>
+        </p:spPr>
+        <p:txBody>
+          <a:bodyPr wrap="square" rtlCol="0">
+            <a:spAutoFit/>
+          </a:bodyPr>
+          <a:lstStyle/>
+          <a:p>
+            <a:pPr algn="ctr"/>
+            <a:r>
+              <a:rPr lang="en-GB" sz="1200" b="1" dirty="0" smtClean="0">
+                <a:latin typeface="CMU Serif" charset="0"/>
+                <a:ea typeface="CMU Serif" charset="0"/>
+                <a:cs typeface="CMU Serif" charset="0"/>
+              </a:rPr>
+              <a:t>1.2</a:t>
+            </a:r>
+          </a:p>
+          <a:p>
+            <a:pPr algn="ctr"/>
+            <a:endParaRPr lang="en-GB" sz="1200" b="1" dirty="0" smtClean="0">
+              <a:latin typeface="CMU Serif" charset="0"/>
+              <a:ea typeface="CMU Serif" charset="0"/>
+              <a:cs typeface="CMU Serif" charset="0"/>
+            </a:endParaRPr>
+          </a:p>
+        </p:txBody>
+      </p:sp>
+    </p:spTree>
+    <p:extLst>
+      <p:ext uri="{BB962C8B-B14F-4D97-AF65-F5344CB8AC3E}">
+        <p14:creationId xmlns:p14="http://schemas.microsoft.com/office/powerpoint/2010/main" val="1528819688"/>
       </p:ext>
     </p:extLst>
   </p:cSld>

</xml_diff>